<commit_message>
Small edits, rearranged a few things and abbreviated some slides
</commit_message>
<xml_diff>
--- a/designreview/designreview.pptx
+++ b/designreview/designreview.pptx
@@ -5,26 +5,24 @@
     <p:sldMasterId id="2147483648" r:id="rId1"/>
   </p:sldMasterIdLst>
   <p:notesMasterIdLst>
-    <p:notesMasterId r:id="rId19"/>
+    <p:notesMasterId r:id="rId17"/>
   </p:notesMasterIdLst>
   <p:sldIdLst>
     <p:sldId id="258" r:id="rId2"/>
     <p:sldId id="260" r:id="rId3"/>
-    <p:sldId id="261" r:id="rId4"/>
-    <p:sldId id="262" r:id="rId5"/>
-    <p:sldId id="263" r:id="rId6"/>
-    <p:sldId id="264" r:id="rId7"/>
-    <p:sldId id="265" r:id="rId8"/>
-    <p:sldId id="271" r:id="rId9"/>
-    <p:sldId id="266" r:id="rId10"/>
-    <p:sldId id="267" r:id="rId11"/>
-    <p:sldId id="268" r:id="rId12"/>
-    <p:sldId id="269" r:id="rId13"/>
-    <p:sldId id="270" r:id="rId14"/>
-    <p:sldId id="272" r:id="rId15"/>
-    <p:sldId id="273" r:id="rId16"/>
-    <p:sldId id="274" r:id="rId17"/>
-    <p:sldId id="275" r:id="rId18"/>
+    <p:sldId id="277" r:id="rId4"/>
+    <p:sldId id="263" r:id="rId5"/>
+    <p:sldId id="264" r:id="rId6"/>
+    <p:sldId id="265" r:id="rId7"/>
+    <p:sldId id="266" r:id="rId8"/>
+    <p:sldId id="267" r:id="rId9"/>
+    <p:sldId id="268" r:id="rId10"/>
+    <p:sldId id="269" r:id="rId11"/>
+    <p:sldId id="270" r:id="rId12"/>
+    <p:sldId id="272" r:id="rId13"/>
+    <p:sldId id="274" r:id="rId14"/>
+    <p:sldId id="273" r:id="rId15"/>
+    <p:sldId id="275" r:id="rId16"/>
   </p:sldIdLst>
   <p:sldSz cx="9144000" cy="6858000" type="screen4x3"/>
   <p:notesSz cx="6858000" cy="9144000"/>
@@ -208,7 +206,7 @@
           <a:p>
             <a:fld id="{732BBF93-3B08-4B83-8221-F119D0C4BF0B}" type="datetimeFigureOut">
               <a:rPr lang="en-US" smtClean="0"/>
-              <a:t>11/24/2012</a:t>
+              <a:t>11/25/12</a:t>
             </a:fld>
             <a:endParaRPr lang="en-US"/>
           </a:p>
@@ -563,7 +561,7 @@
           <a:p>
             <a:fld id="{66C38AFD-935E-47D5-BE5D-1F0F95D61A8E}" type="slidenum">
               <a:rPr lang="en-US" smtClean="0"/>
-              <a:t>8</a:t>
+              <a:t>3</a:t>
             </a:fld>
             <a:endParaRPr lang="en-US"/>
           </a:p>
@@ -657,7 +655,7 @@
           <a:p>
             <a:fld id="{66C38AFD-935E-47D5-BE5D-1F0F95D61A8E}" type="slidenum">
               <a:rPr lang="en-US" smtClean="0"/>
-              <a:t>9</a:t>
+              <a:t>7</a:t>
             </a:fld>
             <a:endParaRPr lang="en-US"/>
           </a:p>
@@ -751,7 +749,7 @@
           <a:p>
             <a:fld id="{66C38AFD-935E-47D5-BE5D-1F0F95D61A8E}" type="slidenum">
               <a:rPr lang="en-US" smtClean="0"/>
-              <a:t>10</a:t>
+              <a:t>8</a:t>
             </a:fld>
             <a:endParaRPr lang="en-US"/>
           </a:p>
@@ -845,7 +843,7 @@
           <a:p>
             <a:fld id="{66C38AFD-935E-47D5-BE5D-1F0F95D61A8E}" type="slidenum">
               <a:rPr lang="en-US" smtClean="0"/>
-              <a:t>11</a:t>
+              <a:t>9</a:t>
             </a:fld>
             <a:endParaRPr lang="en-US"/>
           </a:p>
@@ -939,7 +937,7 @@
           <a:p>
             <a:fld id="{66C38AFD-935E-47D5-BE5D-1F0F95D61A8E}" type="slidenum">
               <a:rPr lang="en-US" smtClean="0"/>
-              <a:t>12</a:t>
+              <a:t>10</a:t>
             </a:fld>
             <a:endParaRPr lang="en-US"/>
           </a:p>
@@ -1033,7 +1031,7 @@
           <a:p>
             <a:fld id="{66C38AFD-935E-47D5-BE5D-1F0F95D61A8E}" type="slidenum">
               <a:rPr lang="en-US" smtClean="0"/>
-              <a:t>13</a:t>
+              <a:t>11</a:t>
             </a:fld>
             <a:endParaRPr lang="en-US"/>
           </a:p>
@@ -1233,7 +1231,7 @@
           <a:p>
             <a:fld id="{5B0C209D-6D03-49A7-AE32-45A630EFA8C6}" type="datetimeFigureOut">
               <a:rPr lang="en-US" smtClean="0"/>
-              <a:t>11/20/2012</a:t>
+              <a:t>11/25/12</a:t>
             </a:fld>
             <a:endParaRPr lang="en-US"/>
           </a:p>
@@ -1403,7 +1401,7 @@
           <a:p>
             <a:fld id="{5B0C209D-6D03-49A7-AE32-45A630EFA8C6}" type="datetimeFigureOut">
               <a:rPr lang="en-US" smtClean="0"/>
-              <a:t>11/20/2012</a:t>
+              <a:t>11/25/12</a:t>
             </a:fld>
             <a:endParaRPr lang="en-US"/>
           </a:p>
@@ -1583,7 +1581,7 @@
           <a:p>
             <a:fld id="{5B0C209D-6D03-49A7-AE32-45A630EFA8C6}" type="datetimeFigureOut">
               <a:rPr lang="en-US" smtClean="0"/>
-              <a:t>11/20/2012</a:t>
+              <a:t>11/25/12</a:t>
             </a:fld>
             <a:endParaRPr lang="en-US"/>
           </a:p>
@@ -1753,7 +1751,7 @@
           <a:p>
             <a:fld id="{5B0C209D-6D03-49A7-AE32-45A630EFA8C6}" type="datetimeFigureOut">
               <a:rPr lang="en-US" smtClean="0"/>
-              <a:t>11/20/2012</a:t>
+              <a:t>11/25/12</a:t>
             </a:fld>
             <a:endParaRPr lang="en-US"/>
           </a:p>
@@ -1999,7 +1997,7 @@
           <a:p>
             <a:fld id="{5B0C209D-6D03-49A7-AE32-45A630EFA8C6}" type="datetimeFigureOut">
               <a:rPr lang="en-US" smtClean="0"/>
-              <a:t>11/20/2012</a:t>
+              <a:t>11/25/12</a:t>
             </a:fld>
             <a:endParaRPr lang="en-US"/>
           </a:p>
@@ -2287,7 +2285,7 @@
           <a:p>
             <a:fld id="{5B0C209D-6D03-49A7-AE32-45A630EFA8C6}" type="datetimeFigureOut">
               <a:rPr lang="en-US" smtClean="0"/>
-              <a:t>11/20/2012</a:t>
+              <a:t>11/25/12</a:t>
             </a:fld>
             <a:endParaRPr lang="en-US"/>
           </a:p>
@@ -2709,7 +2707,7 @@
           <a:p>
             <a:fld id="{5B0C209D-6D03-49A7-AE32-45A630EFA8C6}" type="datetimeFigureOut">
               <a:rPr lang="en-US" smtClean="0"/>
-              <a:t>11/20/2012</a:t>
+              <a:t>11/25/12</a:t>
             </a:fld>
             <a:endParaRPr lang="en-US"/>
           </a:p>
@@ -2827,7 +2825,7 @@
           <a:p>
             <a:fld id="{5B0C209D-6D03-49A7-AE32-45A630EFA8C6}" type="datetimeFigureOut">
               <a:rPr lang="en-US" smtClean="0"/>
-              <a:t>11/20/2012</a:t>
+              <a:t>11/25/12</a:t>
             </a:fld>
             <a:endParaRPr lang="en-US"/>
           </a:p>
@@ -2922,7 +2920,7 @@
           <a:p>
             <a:fld id="{5B0C209D-6D03-49A7-AE32-45A630EFA8C6}" type="datetimeFigureOut">
               <a:rPr lang="en-US" smtClean="0"/>
-              <a:t>11/20/2012</a:t>
+              <a:t>11/25/12</a:t>
             </a:fld>
             <a:endParaRPr lang="en-US"/>
           </a:p>
@@ -3199,7 +3197,7 @@
           <a:p>
             <a:fld id="{5B0C209D-6D03-49A7-AE32-45A630EFA8C6}" type="datetimeFigureOut">
               <a:rPr lang="en-US" smtClean="0"/>
-              <a:t>11/20/2012</a:t>
+              <a:t>11/25/12</a:t>
             </a:fld>
             <a:endParaRPr lang="en-US"/>
           </a:p>
@@ -3452,7 +3450,7 @@
           <a:p>
             <a:fld id="{5B0C209D-6D03-49A7-AE32-45A630EFA8C6}" type="datetimeFigureOut">
               <a:rPr lang="en-US" smtClean="0"/>
-              <a:t>11/20/2012</a:t>
+              <a:t>11/25/12</a:t>
             </a:fld>
             <a:endParaRPr lang="en-US"/>
           </a:p>
@@ -3665,7 +3663,7 @@
           <a:p>
             <a:fld id="{5B0C209D-6D03-49A7-AE32-45A630EFA8C6}" type="datetimeFigureOut">
               <a:rPr lang="en-US" smtClean="0"/>
-              <a:t>11/20/2012</a:t>
+              <a:t>11/25/12</a:t>
             </a:fld>
             <a:endParaRPr lang="en-US"/>
           </a:p>
@@ -4082,7 +4080,7 @@
         <p:spPr/>
         <p:txBody>
           <a:bodyPr>
-            <a:normAutofit fontScale="92500" lnSpcReduction="20000"/>
+            <a:normAutofit fontScale="92500"/>
           </a:bodyPr>
           <a:lstStyle/>
           <a:p>
@@ -4188,19 +4186,17 @@
                   <a:srgbClr val="FF0000"/>
                 </a:solidFill>
               </a:rPr>
-              <a:t> Park</a:t>
-            </a:r>
-          </a:p>
-          <a:p>
+              <a:t> </a:t>
+            </a:r>
             <a:r>
               <a:rPr lang="en-US" dirty="0" smtClean="0">
                 <a:solidFill>
                   <a:srgbClr val="FF0000"/>
                 </a:solidFill>
               </a:rPr>
-              <a:t>and the Ghost of Christmas Past</a:t>
-            </a:r>
-            <a:endParaRPr lang="en-US" dirty="0">
+              <a:t>Park</a:t>
+            </a:r>
+            <a:endParaRPr lang="en-US" dirty="0" smtClean="0">
               <a:solidFill>
                 <a:srgbClr val="FF0000"/>
               </a:solidFill>
@@ -4287,123 +4283,111 @@
         <p:spPr/>
         <p:txBody>
           <a:bodyPr>
-            <a:normAutofit lnSpcReduction="10000"/>
+            <a:normAutofit fontScale="92500" lnSpcReduction="10000"/>
           </a:bodyPr>
           <a:lstStyle/>
           <a:p>
             <a:r>
+              <a:rPr lang="en-US" dirty="0" smtClean="0"/>
+              <a:t>Integrator</a:t>
+            </a:r>
+          </a:p>
+          <a:p>
+            <a:pPr lvl="1"/>
+            <a:r>
+              <a:rPr lang="en-US" dirty="0" smtClean="0"/>
+              <a:t>Many integrators exist corresponding to different ensembles</a:t>
+            </a:r>
+          </a:p>
+          <a:p>
+            <a:pPr lvl="1"/>
+            <a:r>
+              <a:rPr lang="en-US" dirty="0" smtClean="0"/>
+              <a:t>Abstract </a:t>
+            </a:r>
+            <a:r>
               <a:rPr lang="en-US" dirty="0"/>
-              <a:t>Atom</a:t>
+              <a:t>base class, allowing the user to expand on what we develop and add new integrators </a:t>
+            </a:r>
+            <a:r>
+              <a:rPr lang="en-US" dirty="0" smtClean="0"/>
+              <a:t>in the future</a:t>
+            </a:r>
+          </a:p>
+          <a:p>
+            <a:pPr lvl="1"/>
+            <a:r>
+              <a:rPr lang="en-US" dirty="0" smtClean="0"/>
+              <a:t>NVE, NVT, NPT</a:t>
             </a:r>
             <a:endParaRPr lang="en-US" dirty="0" smtClean="0"/>
           </a:p>
           <a:p>
-            <a:pPr lvl="1"/>
+            <a:pPr lvl="2"/>
+            <a:r>
+              <a:rPr lang="en-US" dirty="0" smtClean="0"/>
+              <a:t>NVE integrators </a:t>
+            </a:r>
             <a:r>
               <a:rPr lang="en-US" dirty="0"/>
-              <a:t>This will be a structure, i.e. no functions will be stored in this </a:t>
-            </a:r>
-            <a:r>
-              <a:rPr lang="en-US" dirty="0" smtClean="0"/>
-              <a:t>class</a:t>
-            </a:r>
+              <a:t>include </a:t>
+            </a:r>
+            <a:r>
+              <a:rPr lang="en-US" dirty="0" err="1"/>
+              <a:t>Verlet</a:t>
+            </a:r>
+            <a:r>
+              <a:rPr lang="en-US" dirty="0"/>
+              <a:t>, Velocity </a:t>
+            </a:r>
+            <a:r>
+              <a:rPr lang="en-US" dirty="0" err="1" smtClean="0"/>
+              <a:t>Verlet</a:t>
+            </a:r>
+            <a:r>
+              <a:rPr lang="en-US" dirty="0" smtClean="0"/>
+              <a:t>, and </a:t>
+            </a:r>
+            <a:r>
+              <a:rPr lang="en-US" dirty="0"/>
+              <a:t>the Leapfrog algorithm. </a:t>
+            </a:r>
+            <a:endParaRPr lang="en-US" dirty="0" smtClean="0"/>
           </a:p>
           <a:p>
             <a:pPr lvl="2"/>
             <a:r>
               <a:rPr lang="en-US" dirty="0" smtClean="0"/>
-              <a:t>This </a:t>
+              <a:t>Thermostats </a:t>
             </a:r>
             <a:r>
               <a:rPr lang="en-US" dirty="0"/>
-              <a:t>is the </a:t>
-            </a:r>
-            <a:r>
-              <a:rPr lang="en-US" dirty="0" smtClean="0"/>
-              <a:t>main “workhorse</a:t>
+              <a:t>and </a:t>
+            </a:r>
+            <a:r>
+              <a:rPr lang="en-US" dirty="0" err="1"/>
+              <a:t>barostats</a:t>
             </a:r>
             <a:r>
               <a:rPr lang="en-US" dirty="0"/>
-              <a:t>” of the program </a:t>
+              <a:t> (required for the NVT and NPT </a:t>
+            </a:r>
+            <a:r>
+              <a:rPr lang="en-US" dirty="0" smtClean="0"/>
+              <a:t>ensembles) include </a:t>
+            </a:r>
+            <a:r>
+              <a:rPr lang="en-US" dirty="0"/>
+              <a:t>Nose-Hoover and Anderson.</a:t>
             </a:r>
             <a:endParaRPr lang="en-US" dirty="0" smtClean="0"/>
-          </a:p>
-          <a:p>
-            <a:pPr lvl="2"/>
-            <a:r>
-              <a:rPr lang="en-US" dirty="0" smtClean="0"/>
-              <a:t>will </a:t>
-            </a:r>
-            <a:r>
-              <a:rPr lang="en-US" dirty="0"/>
-              <a:t>need to be passed repeatedly between processors to </a:t>
-            </a:r>
-            <a:r>
-              <a:rPr lang="en-US" dirty="0" smtClean="0"/>
-              <a:t>communicate requisite </a:t>
-            </a:r>
-            <a:r>
-              <a:rPr lang="en-US" dirty="0"/>
-              <a:t>information for the integration </a:t>
-            </a:r>
-            <a:r>
-              <a:rPr lang="en-US" dirty="0" smtClean="0"/>
-              <a:t>step</a:t>
-            </a:r>
-          </a:p>
-          <a:p>
-            <a:pPr lvl="1"/>
-            <a:r>
-              <a:rPr lang="en-US" dirty="0" smtClean="0"/>
-              <a:t>Will only </a:t>
-            </a:r>
-            <a:r>
-              <a:rPr lang="en-US" dirty="0"/>
-              <a:t>store critical </a:t>
-            </a:r>
-            <a:r>
-              <a:rPr lang="en-US" dirty="0" smtClean="0"/>
-              <a:t>information and </a:t>
-            </a:r>
-            <a:r>
-              <a:rPr lang="en-US" dirty="0"/>
-              <a:t>base data types easily passed through </a:t>
-            </a:r>
-            <a:r>
-              <a:rPr lang="en-US" dirty="0" smtClean="0"/>
-              <a:t>MPI</a:t>
-            </a:r>
-          </a:p>
-          <a:p>
-            <a:pPr lvl="2"/>
-            <a:r>
-              <a:rPr lang="en-US" dirty="0" smtClean="0"/>
-              <a:t>Positions</a:t>
-            </a:r>
-            <a:r>
-              <a:rPr lang="en-US" dirty="0"/>
-              <a:t>, </a:t>
-            </a:r>
-            <a:r>
-              <a:rPr lang="en-US" dirty="0" smtClean="0"/>
-              <a:t>velocities, and particle </a:t>
-            </a:r>
-            <a:r>
-              <a:rPr lang="en-US" dirty="0"/>
-              <a:t>types that are necessary for the force </a:t>
-            </a:r>
-            <a:r>
-              <a:rPr lang="en-US" dirty="0" smtClean="0"/>
-              <a:t>calculations</a:t>
-            </a:r>
-            <a:endParaRPr lang="en-US" dirty="0"/>
           </a:p>
         </p:txBody>
       </p:sp>
     </p:spTree>
     <p:extLst>
       <p:ext uri="{BB962C8B-B14F-4D97-AF65-F5344CB8AC3E}">
-        <p14:creationId xmlns:p14="http://schemas.microsoft.com/office/powerpoint/2010/main" val="2026033022"/>
+        <p14:creationId xmlns:p14="http://schemas.microsoft.com/office/powerpoint/2010/main" val="2879809863"/>
       </p:ext>
     </p:extLst>
   </p:cSld>
@@ -4479,119 +4463,125 @@
         <p:spPr/>
         <p:txBody>
           <a:bodyPr>
-            <a:normAutofit fontScale="77500" lnSpcReduction="20000"/>
+            <a:normAutofit/>
           </a:bodyPr>
           <a:lstStyle/>
           <a:p>
             <a:r>
               <a:rPr lang="en-US" dirty="0" smtClean="0"/>
-              <a:t>Bond</a:t>
+              <a:t>Pair Potentials</a:t>
             </a:r>
           </a:p>
           <a:p>
             <a:pPr lvl="1"/>
             <a:r>
-              <a:rPr lang="en-US" dirty="0" smtClean="0"/>
-              <a:t>Largest </a:t>
-            </a:r>
-            <a:r>
               <a:rPr lang="en-US" dirty="0"/>
-              <a:t>complication in MD, because global indices must be tracked to </a:t>
-            </a:r>
-            <a:r>
-              <a:rPr lang="en-US" dirty="0" smtClean="0"/>
-              <a:t>manage what </a:t>
+              <a:t>This class deﬁnes the interaction potential V between particles. As it is the most common, we </a:t>
+            </a:r>
+            <a:r>
+              <a:rPr lang="en-US" dirty="0" smtClean="0"/>
+              <a:t>will provide </a:t>
             </a:r>
             <a:r>
               <a:rPr lang="en-US" dirty="0"/>
-              <a:t>atoms are bonded to each other (since atoms participating in a bond may exist on </a:t>
-            </a:r>
-            <a:r>
-              <a:rPr lang="en-US" dirty="0" smtClean="0"/>
-              <a:t>diﬀerent processors) </a:t>
+              <a:t>a shifted </a:t>
+            </a:r>
+            <a:r>
+              <a:rPr lang="en-US" dirty="0" err="1"/>
+              <a:t>Lennard</a:t>
+            </a:r>
+            <a:r>
+              <a:rPr lang="en-US" dirty="0"/>
+              <a:t>-Jones pair </a:t>
+            </a:r>
+            <a:r>
+              <a:rPr lang="en-US" dirty="0" smtClean="0"/>
+              <a:t>potential</a:t>
             </a:r>
           </a:p>
           <a:p>
             <a:pPr lvl="1"/>
             <a:r>
               <a:rPr lang="en-US" dirty="0" smtClean="0"/>
-              <a:t>Abstract </a:t>
+              <a:t>Users </a:t>
             </a:r>
             <a:r>
               <a:rPr lang="en-US" dirty="0"/>
-              <a:t>base class which allows users to deﬁne diﬀerent </a:t>
-            </a:r>
-            <a:r>
-              <a:rPr lang="en-US" dirty="0" smtClean="0"/>
-              <a:t>types easily</a:t>
+              <a:t>can </a:t>
+            </a:r>
+            <a:r>
+              <a:rPr lang="en-US" dirty="0" smtClean="0"/>
+              <a:t>easily add </a:t>
             </a:r>
             <a:r>
               <a:rPr lang="en-US" dirty="0"/>
-              <a:t>, requiring only that each deﬁned type have an energy and force </a:t>
-            </a:r>
-            <a:r>
-              <a:rPr lang="en-US" dirty="0" smtClean="0"/>
-              <a:t>calculation</a:t>
-            </a:r>
-          </a:p>
-          <a:p>
-            <a:pPr lvl="1"/>
-            <a:r>
-              <a:rPr lang="en-US" dirty="0" smtClean="0"/>
-              <a:t>Parameters involved in </a:t>
-            </a:r>
-            <a:r>
-              <a:rPr lang="en-US" dirty="0"/>
-              <a:t>a bond “type” will be set by the user and available on all processors at all times so such </a:t>
-            </a:r>
-            <a:r>
-              <a:rPr lang="en-US" dirty="0" smtClean="0"/>
-              <a:t>information need </a:t>
-            </a:r>
-            <a:r>
-              <a:rPr lang="en-US" dirty="0"/>
-              <a:t>not be passed; the only information necessary to compute bonding contributions an array </a:t>
-            </a:r>
-            <a:r>
-              <a:rPr lang="en-US" dirty="0" smtClean="0"/>
-              <a:t>of bonded </a:t>
-            </a:r>
-            <a:r>
-              <a:rPr lang="en-US" dirty="0"/>
-              <a:t>pairs of atoms and their “type.” </a:t>
+              <a:t>additional pair potentials.</a:t>
             </a:r>
             <a:endParaRPr lang="en-US" dirty="0" smtClean="0"/>
           </a:p>
-          <a:p>
-            <a:pPr lvl="1"/>
-            <a:r>
-              <a:rPr lang="en-US" dirty="0" smtClean="0"/>
-              <a:t>The </a:t>
-            </a:r>
-            <a:r>
-              <a:rPr lang="en-US" dirty="0"/>
-              <a:t>bond type is an internally indexed quantity that </a:t>
-            </a:r>
-            <a:r>
-              <a:rPr lang="en-US" dirty="0" smtClean="0"/>
-              <a:t>is hidden </a:t>
-            </a:r>
-            <a:r>
-              <a:rPr lang="en-US" dirty="0"/>
-              <a:t>from the user, and is accessed by a name (string</a:t>
-            </a:r>
-            <a:r>
-              <a:rPr lang="en-US" dirty="0" smtClean="0"/>
-              <a:t>)</a:t>
-            </a:r>
-            <a:endParaRPr lang="en-US" dirty="0"/>
-          </a:p>
-        </p:txBody>
-      </p:sp>
+        </p:txBody>
+      </p:sp>
+      <p:graphicFrame>
+        <p:nvGraphicFramePr>
+          <p:cNvPr id="5" name="Object 4"/>
+          <p:cNvGraphicFramePr>
+            <a:graphicFrameLocks noChangeAspect="1"/>
+          </p:cNvGraphicFramePr>
+          <p:nvPr>
+            <p:extLst>
+              <p:ext uri="{D42A27DB-BD31-4B8C-83A1-F6EECF244321}">
+                <p14:modId xmlns:p14="http://schemas.microsoft.com/office/powerpoint/2010/main" val="3456480411"/>
+              </p:ext>
+            </p:extLst>
+          </p:nvPr>
+        </p:nvGraphicFramePr>
+        <p:xfrm>
+          <a:off x="1183888" y="4267200"/>
+          <a:ext cx="6969512" cy="1905000"/>
+        </p:xfrm>
+        <a:graphic>
+          <a:graphicData uri="http://schemas.openxmlformats.org/presentationml/2006/ole">
+            <mc:AlternateContent xmlns:mc="http://schemas.openxmlformats.org/markup-compatibility/2006">
+              <mc:Choice xmlns:v="urn:schemas-microsoft-com:vml" Requires="v">
+                <p:oleObj spid="_x0000_s4122" name="Equation" r:id="rId4" imgW="1905000" imgH="520700" progId="Equation.3">
+                  <p:embed/>
+                </p:oleObj>
+              </mc:Choice>
+              <mc:Fallback>
+                <p:oleObj name="Equation" r:id="rId4" imgW="1905000" imgH="520700" progId="Equation.3">
+                  <p:embed/>
+                  <p:pic>
+                    <p:nvPicPr>
+                      <p:cNvPr id="0" name=""/>
+                      <p:cNvPicPr/>
+                      <p:nvPr/>
+                    </p:nvPicPr>
+                    <p:blipFill>
+                      <a:blip r:embed="rId5"/>
+                      <a:stretch>
+                        <a:fillRect/>
+                      </a:stretch>
+                    </p:blipFill>
+                    <p:spPr>
+                      <a:xfrm>
+                        <a:off x="1183888" y="4267200"/>
+                        <a:ext cx="6969512" cy="1905000"/>
+                      </a:xfrm>
+                      <a:prstGeom prst="rect">
+                        <a:avLst/>
+                      </a:prstGeom>
+                    </p:spPr>
+                  </p:pic>
+                </p:oleObj>
+              </mc:Fallback>
+            </mc:AlternateContent>
+          </a:graphicData>
+        </a:graphic>
+      </p:graphicFrame>
     </p:spTree>
     <p:extLst>
       <p:ext uri="{BB962C8B-B14F-4D97-AF65-F5344CB8AC3E}">
-        <p14:creationId xmlns:p14="http://schemas.microsoft.com/office/powerpoint/2010/main" val="3908138487"/>
+        <p14:creationId xmlns:p14="http://schemas.microsoft.com/office/powerpoint/2010/main" val="3299923065"/>
       </p:ext>
     </p:extLst>
   </p:cSld>
@@ -4630,171 +4620,84 @@
         </p:nvSpPr>
         <p:spPr/>
         <p:txBody>
+          <a:bodyPr/>
+          <a:lstStyle/>
+          <a:p>
+            <a:r>
+              <a:rPr lang="en-US" dirty="0" smtClean="0"/>
+              <a:t>Code Features</a:t>
+            </a:r>
+            <a:endParaRPr lang="en-US" dirty="0"/>
+          </a:p>
+        </p:txBody>
+      </p:sp>
+      <p:sp>
+        <p:nvSpPr>
+          <p:cNvPr id="3" name="Content Placeholder 2"/>
+          <p:cNvSpPr>
+            <a:spLocks noGrp="1"/>
+          </p:cNvSpPr>
+          <p:nvPr>
+            <p:ph idx="1"/>
+          </p:nvPr>
+        </p:nvSpPr>
+        <p:spPr/>
+        <p:txBody>
           <a:bodyPr>
-            <a:normAutofit fontScale="90000"/>
+            <a:normAutofit/>
           </a:bodyPr>
           <a:lstStyle/>
           <a:p>
             <a:r>
-              <a:rPr lang="en-US" dirty="0" smtClean="0"/>
-              <a:t>An Efficient Interface to </a:t>
-            </a:r>
-            <a:br>
-              <a:rPr lang="en-US" dirty="0" smtClean="0"/>
-            </a:br>
-            <a:r>
-              <a:rPr lang="en-US" dirty="0" smtClean="0"/>
-              <a:t>Facilitate </a:t>
+              <a:rPr lang="en-US" dirty="0"/>
+              <a:t>The program should be able to easily be extended to use arbitrary </a:t>
+            </a:r>
+            <a:r>
+              <a:rPr lang="en-US" dirty="0" err="1"/>
+              <a:t>interparticle</a:t>
+            </a:r>
+            <a:r>
+              <a:rPr lang="en-US" dirty="0"/>
+              <a:t> potentials as long </a:t>
+            </a:r>
+            <a:r>
+              <a:rPr lang="en-US" dirty="0" smtClean="0"/>
+              <a:t>as they </a:t>
+            </a:r>
+            <a:r>
+              <a:rPr lang="en-US" dirty="0"/>
+              <a:t>conform to the abstract base class. As an example, we will use </a:t>
             </a:r>
             <a:r>
               <a:rPr lang="en-US" dirty="0" err="1" smtClean="0"/>
-              <a:t>Groupwork</a:t>
+              <a:t>Lennard</a:t>
+            </a:r>
+            <a:r>
+              <a:rPr lang="en-US" dirty="0" smtClean="0"/>
+              <a:t>-Jones</a:t>
+            </a:r>
+          </a:p>
+          <a:p>
+            <a:r>
+              <a:rPr lang="en-US" dirty="0"/>
+              <a:t>The MD program should be able to print out binary ﬁles that can be visualized using VMD or </a:t>
+            </a:r>
+            <a:r>
+              <a:rPr lang="en-US" dirty="0" smtClean="0"/>
+              <a:t>other </a:t>
+            </a:r>
+            <a:r>
+              <a:rPr lang="en-US" dirty="0" smtClean="0"/>
+              <a:t>programs</a:t>
             </a:r>
             <a:endParaRPr lang="en-US" dirty="0"/>
-          </a:p>
-        </p:txBody>
-      </p:sp>
-      <p:sp>
-        <p:nvSpPr>
-          <p:cNvPr id="3" name="Content Placeholder 2"/>
-          <p:cNvSpPr>
-            <a:spLocks noGrp="1"/>
-          </p:cNvSpPr>
-          <p:nvPr>
-            <p:ph idx="1"/>
-          </p:nvPr>
-        </p:nvSpPr>
-        <p:spPr/>
-        <p:txBody>
-          <a:bodyPr>
-            <a:normAutofit fontScale="85000" lnSpcReduction="10000"/>
-          </a:bodyPr>
-          <a:lstStyle/>
-          <a:p>
-            <a:r>
-              <a:rPr lang="en-US" dirty="0" smtClean="0"/>
-              <a:t>Integrator</a:t>
-            </a:r>
-          </a:p>
-          <a:p>
-            <a:pPr lvl="1"/>
-            <a:r>
-              <a:rPr lang="en-US" dirty="0" smtClean="0"/>
-              <a:t>Many integrators exist corresponding to different ensembles</a:t>
-            </a:r>
-          </a:p>
-          <a:p>
-            <a:pPr lvl="1"/>
-            <a:r>
-              <a:rPr lang="en-US" dirty="0" smtClean="0"/>
-              <a:t>Abstract </a:t>
-            </a:r>
-            <a:r>
-              <a:rPr lang="en-US" dirty="0"/>
-              <a:t>base class, allowing the user to expand on what we develop and add new integrators </a:t>
-            </a:r>
-            <a:r>
-              <a:rPr lang="en-US" dirty="0" smtClean="0"/>
-              <a:t>in the future</a:t>
-            </a:r>
-          </a:p>
-          <a:p>
-            <a:pPr lvl="1"/>
-            <a:r>
-              <a:rPr lang="en-US" dirty="0" smtClean="0"/>
-              <a:t>We </a:t>
-            </a:r>
-            <a:r>
-              <a:rPr lang="en-US" dirty="0"/>
-              <a:t>plan to implement integrators for the </a:t>
-            </a:r>
-            <a:r>
-              <a:rPr lang="en-US" dirty="0" err="1"/>
-              <a:t>microcanonical</a:t>
-            </a:r>
-            <a:r>
-              <a:rPr lang="en-US" dirty="0"/>
-              <a:t> (NVE), canonical (NVT), </a:t>
-            </a:r>
-            <a:r>
-              <a:rPr lang="en-US" dirty="0" smtClean="0"/>
-              <a:t>and isothermal-isobaric </a:t>
-            </a:r>
-            <a:r>
-              <a:rPr lang="en-US" dirty="0"/>
-              <a:t>ensemble (NPT). For the NVE </a:t>
-            </a:r>
-            <a:r>
-              <a:rPr lang="en-US" dirty="0" smtClean="0"/>
-              <a:t>ensemble</a:t>
-            </a:r>
-          </a:p>
-          <a:p>
-            <a:pPr lvl="1"/>
-            <a:r>
-              <a:rPr lang="en-US" dirty="0" smtClean="0"/>
-              <a:t>Integrators </a:t>
-            </a:r>
-            <a:r>
-              <a:rPr lang="en-US" dirty="0"/>
-              <a:t>include </a:t>
-            </a:r>
-            <a:r>
-              <a:rPr lang="en-US" dirty="0" err="1"/>
-              <a:t>Verlet</a:t>
-            </a:r>
-            <a:r>
-              <a:rPr lang="en-US" dirty="0"/>
-              <a:t>, Velocity </a:t>
-            </a:r>
-            <a:r>
-              <a:rPr lang="en-US" dirty="0" err="1" smtClean="0"/>
-              <a:t>Verlet</a:t>
-            </a:r>
-            <a:r>
-              <a:rPr lang="en-US" dirty="0" smtClean="0"/>
-              <a:t>, and </a:t>
-            </a:r>
-            <a:r>
-              <a:rPr lang="en-US" dirty="0"/>
-              <a:t>the Leapfrog algorithm. </a:t>
-            </a:r>
-            <a:endParaRPr lang="en-US" dirty="0" smtClean="0"/>
-          </a:p>
-          <a:p>
-            <a:pPr lvl="1"/>
-            <a:r>
-              <a:rPr lang="en-US" dirty="0" smtClean="0"/>
-              <a:t>Thermostats </a:t>
-            </a:r>
-            <a:r>
-              <a:rPr lang="en-US" dirty="0"/>
-              <a:t>and </a:t>
-            </a:r>
-            <a:r>
-              <a:rPr lang="en-US" dirty="0" err="1"/>
-              <a:t>barostats</a:t>
-            </a:r>
-            <a:r>
-              <a:rPr lang="en-US" dirty="0"/>
-              <a:t> (required for the NVT and NPT </a:t>
-            </a:r>
-            <a:r>
-              <a:rPr lang="en-US" dirty="0" smtClean="0"/>
-              <a:t>ensembles) include </a:t>
-            </a:r>
-            <a:r>
-              <a:rPr lang="en-US" dirty="0"/>
-              <a:t>Nose-Hoover and Anderson.</a:t>
-            </a:r>
-            <a:endParaRPr lang="en-US" dirty="0" smtClean="0"/>
           </a:p>
         </p:txBody>
       </p:sp>
     </p:spTree>
     <p:extLst>
       <p:ext uri="{BB962C8B-B14F-4D97-AF65-F5344CB8AC3E}">
-        <p14:creationId xmlns:p14="http://schemas.microsoft.com/office/powerpoint/2010/main" val="2879809863"/>
+        <p14:creationId xmlns:p14="http://schemas.microsoft.com/office/powerpoint/2010/main" val="3981756651"/>
       </p:ext>
     </p:extLst>
   </p:cSld>
@@ -4833,25 +4736,12 @@
         </p:nvSpPr>
         <p:spPr/>
         <p:txBody>
-          <a:bodyPr>
-            <a:normAutofit fontScale="90000"/>
-          </a:bodyPr>
-          <a:lstStyle/>
-          <a:p>
-            <a:r>
-              <a:rPr lang="en-US" dirty="0" smtClean="0"/>
-              <a:t>An Efficient Interface to </a:t>
-            </a:r>
-            <a:br>
-              <a:rPr lang="en-US" dirty="0" smtClean="0"/>
-            </a:br>
-            <a:r>
-              <a:rPr lang="en-US" dirty="0" smtClean="0"/>
-              <a:t>Facilitate </a:t>
-            </a:r>
-            <a:r>
-              <a:rPr lang="en-US" dirty="0" err="1" smtClean="0"/>
-              <a:t>Groupwork</a:t>
+          <a:bodyPr/>
+          <a:lstStyle/>
+          <a:p>
+            <a:r>
+              <a:rPr lang="en-US" dirty="0" smtClean="0"/>
+              <a:t>Code Features</a:t>
             </a:r>
             <a:endParaRPr lang="en-US" dirty="0"/>
           </a:p>
@@ -4876,124 +4766,98 @@
           <a:p>
             <a:r>
               <a:rPr lang="en-US" dirty="0" smtClean="0"/>
-              <a:t>Pair Potentials</a:t>
+              <a:t>Two starting </a:t>
+            </a:r>
+            <a:r>
+              <a:rPr lang="en-US" dirty="0" err="1" smtClean="0"/>
+              <a:t>mehcanisms</a:t>
+            </a:r>
+            <a:r>
+              <a:rPr lang="en-US" dirty="0" smtClean="0"/>
+              <a:t>:</a:t>
             </a:r>
           </a:p>
           <a:p>
             <a:pPr lvl="1"/>
             <a:r>
+              <a:rPr lang="en-US" dirty="0" smtClean="0"/>
+              <a:t>Reading an input ﬁle</a:t>
+            </a:r>
+          </a:p>
+          <a:p>
+            <a:pPr lvl="1"/>
+            <a:r>
+              <a:rPr lang="en-US" dirty="0" err="1" smtClean="0"/>
+              <a:t>Pythonic</a:t>
+            </a:r>
+            <a:r>
+              <a:rPr lang="en-US" dirty="0" smtClean="0"/>
+              <a:t> questionnaire</a:t>
+            </a:r>
+            <a:endParaRPr lang="en-US" dirty="0" smtClean="0"/>
+          </a:p>
+          <a:p>
+            <a:r>
+              <a:rPr lang="en-US" dirty="0" smtClean="0"/>
+              <a:t>Periodic checkpoints</a:t>
+            </a:r>
+          </a:p>
+          <a:p>
+            <a:r>
+              <a:rPr lang="en-US" dirty="0" smtClean="0"/>
+              <a:t>Arbitrary bonds (</a:t>
+            </a:r>
+            <a:r>
+              <a:rPr lang="en-US" dirty="0" smtClean="0"/>
+              <a:t>as </a:t>
+            </a:r>
+            <a:r>
               <a:rPr lang="en-US" dirty="0"/>
-              <a:t>This class deﬁnes the interaction potential V between particles. As it is the most common, we </a:t>
-            </a:r>
-            <a:r>
-              <a:rPr lang="en-US" dirty="0" smtClean="0"/>
-              <a:t>will provide </a:t>
+              <a:t>long as they conform to </a:t>
+            </a:r>
+            <a:r>
+              <a:rPr lang="en-US" dirty="0" smtClean="0"/>
+              <a:t>the </a:t>
+            </a:r>
+            <a:r>
+              <a:rPr lang="en-US" dirty="0" smtClean="0"/>
+              <a:t>abstract </a:t>
             </a:r>
             <a:r>
               <a:rPr lang="en-US" dirty="0"/>
-              <a:t>a shifted </a:t>
-            </a:r>
-            <a:r>
-              <a:rPr lang="en-US" dirty="0" err="1"/>
-              <a:t>Lennard</a:t>
+              <a:t>base </a:t>
+            </a:r>
+            <a:r>
+              <a:rPr lang="en-US" dirty="0" smtClean="0"/>
+              <a:t>class) </a:t>
+            </a:r>
+          </a:p>
+          <a:p>
+            <a:pPr lvl="1"/>
+            <a:r>
+              <a:rPr lang="en-US" dirty="0" smtClean="0"/>
+              <a:t>Extensible </a:t>
+            </a:r>
+            <a:r>
+              <a:rPr lang="en-US" dirty="0" smtClean="0"/>
+              <a:t>to </a:t>
             </a:r>
             <a:r>
               <a:rPr lang="en-US" dirty="0"/>
-              <a:t>-Jones pair </a:t>
-            </a:r>
-            <a:r>
-              <a:rPr lang="en-US" dirty="0" smtClean="0"/>
-              <a:t>potential</a:t>
-            </a:r>
-          </a:p>
-          <a:p>
-            <a:pPr lvl="1"/>
-            <a:r>
-              <a:rPr lang="en-US" dirty="0" smtClean="0"/>
-              <a:t>Users </a:t>
-            </a:r>
-            <a:r>
-              <a:rPr lang="en-US" dirty="0"/>
-              <a:t>can </a:t>
-            </a:r>
-            <a:r>
-              <a:rPr lang="en-US" dirty="0" smtClean="0"/>
-              <a:t>easily add </a:t>
-            </a:r>
-            <a:r>
-              <a:rPr lang="en-US" dirty="0"/>
-              <a:t>additional pair potentials.</a:t>
-            </a:r>
-            <a:endParaRPr lang="en-US" dirty="0" smtClean="0"/>
-          </a:p>
-        </p:txBody>
-      </p:sp>
-      <p:graphicFrame>
-        <p:nvGraphicFramePr>
-          <p:cNvPr id="4" name="Object 3"/>
-          <p:cNvGraphicFramePr>
-            <a:graphicFrameLocks noChangeAspect="1"/>
-          </p:cNvGraphicFramePr>
-          <p:nvPr>
-            <p:extLst>
-              <p:ext uri="{D42A27DB-BD31-4B8C-83A1-F6EECF244321}">
-                <p14:modId xmlns:p14="http://schemas.microsoft.com/office/powerpoint/2010/main" val="2620657988"/>
-              </p:ext>
-            </p:extLst>
-          </p:nvPr>
-        </p:nvGraphicFramePr>
-        <p:xfrm>
-          <a:off x="560070" y="4419600"/>
-          <a:ext cx="7974330" cy="1981200"/>
-        </p:xfrm>
-        <a:graphic>
-          <a:graphicData uri="http://schemas.openxmlformats.org/presentationml/2006/ole">
-            <mc:AlternateContent xmlns:mc="http://schemas.openxmlformats.org/markup-compatibility/2006">
-              <mc:Choice xmlns:v="urn:schemas-microsoft-com:vml" Requires="v">
-                <p:oleObj spid="_x0000_s4116" name="Equation" r:id="rId4" imgW="2044440" imgH="507960" progId="Equation.DSMT4">
-                  <p:embed/>
-                </p:oleObj>
-              </mc:Choice>
-              <mc:Fallback>
-                <p:oleObj name="Equation" r:id="rId4" imgW="2044440" imgH="507960" progId="Equation.DSMT4">
-                  <p:embed/>
-                  <p:pic>
-                    <p:nvPicPr>
-                      <p:cNvPr id="0" name=""/>
-                      <p:cNvPicPr/>
-                      <p:nvPr/>
-                    </p:nvPicPr>
-                    <p:blipFill>
-                      <a:blip r:embed="rId5"/>
-                      <a:stretch>
-                        <a:fillRect/>
-                      </a:stretch>
-                    </p:blipFill>
-                    <p:spPr>
-                      <a:xfrm>
-                        <a:off x="560070" y="4419600"/>
-                        <a:ext cx="7974330" cy="1981200"/>
-                      </a:xfrm>
-                      <a:prstGeom prst="rect">
-                        <a:avLst/>
-                      </a:prstGeom>
-                      <a:ln w="38100">
-                        <a:solidFill>
-                          <a:srgbClr val="FF0000"/>
-                        </a:solidFill>
-                      </a:ln>
-                    </p:spPr>
-                  </p:pic>
-                </p:oleObj>
-              </mc:Fallback>
-            </mc:AlternateContent>
-          </a:graphicData>
-        </a:graphic>
-      </p:graphicFrame>
+              <a:t>arbitrarily </a:t>
+            </a:r>
+            <a:r>
+              <a:rPr lang="en-US" dirty="0" smtClean="0"/>
+              <a:t>complex molecules</a:t>
+            </a:r>
+            <a:endParaRPr lang="en-US" dirty="0"/>
+          </a:p>
+        </p:txBody>
+      </p:sp>
     </p:spTree>
     <p:extLst>
       <p:ext uri="{BB962C8B-B14F-4D97-AF65-F5344CB8AC3E}">
-        <p14:creationId xmlns:p14="http://schemas.microsoft.com/office/powerpoint/2010/main" val="3299923065"/>
+        <p14:creationId xmlns:p14="http://schemas.microsoft.com/office/powerpoint/2010/main" val="1949845610"/>
       </p:ext>
     </p:extLst>
   </p:cSld>
@@ -5056,154 +4920,57 @@
         <p:spPr/>
         <p:txBody>
           <a:bodyPr>
-            <a:normAutofit lnSpcReduction="10000"/>
+            <a:normAutofit/>
           </a:bodyPr>
           <a:lstStyle/>
           <a:p>
             <a:r>
               <a:rPr lang="en-US" dirty="0"/>
-              <a:t>The program should be able to easily be extended to use arbitrary </a:t>
-            </a:r>
-            <a:r>
-              <a:rPr lang="en-US" dirty="0" err="1"/>
-              <a:t>interparticle</a:t>
+              <a:t>Run </a:t>
+            </a:r>
+            <a:r>
+              <a:rPr lang="en-US" dirty="0" smtClean="0"/>
+              <a:t>for arbitrary </a:t>
+            </a:r>
+            <a:r>
+              <a:rPr lang="en-US" dirty="0" smtClean="0"/>
+              <a:t>length </a:t>
             </a:r>
             <a:r>
               <a:rPr lang="en-US" dirty="0"/>
-              <a:t> potentials as long </a:t>
-            </a:r>
-            <a:r>
-              <a:rPr lang="en-US" dirty="0" smtClean="0"/>
-              <a:t>as they </a:t>
+              <a:t>of time on an arbitrary </a:t>
+            </a:r>
+            <a:r>
+              <a:rPr lang="en-US" dirty="0" smtClean="0"/>
+              <a:t>number of processors</a:t>
+            </a:r>
+            <a:r>
+              <a:rPr lang="en-US" dirty="0" smtClean="0"/>
+              <a:t>.</a:t>
+            </a:r>
+          </a:p>
+          <a:p>
+            <a:r>
+              <a:rPr lang="en-US" dirty="0" smtClean="0"/>
+              <a:t>Interface with VMD </a:t>
             </a:r>
             <a:r>
               <a:rPr lang="en-US" dirty="0"/>
-              <a:t>conform to the abstract base class. As an example, we will use </a:t>
-            </a:r>
-            <a:r>
-              <a:rPr lang="en-US" dirty="0" err="1" smtClean="0"/>
-              <a:t>Lennard</a:t>
-            </a:r>
-            <a:r>
-              <a:rPr lang="en-US" dirty="0" smtClean="0"/>
-              <a:t>-Jones</a:t>
-            </a:r>
-          </a:p>
-          <a:p>
+              <a:t>or </a:t>
+            </a:r>
+            <a:r>
+              <a:rPr lang="en-US" dirty="0" smtClean="0"/>
+              <a:t>other visualization </a:t>
+            </a:r>
             <a:r>
               <a:rPr lang="en-US" dirty="0"/>
-              <a:t>The MD program should be able to print out binary ﬁles that can be visualized using VMD or </a:t>
-            </a:r>
-            <a:r>
-              <a:rPr lang="en-US" dirty="0" smtClean="0"/>
-              <a:t>other visualization </a:t>
-            </a:r>
-            <a:r>
-              <a:rPr lang="en-US" dirty="0"/>
-              <a:t>programs that exist, as well as xml </a:t>
-            </a:r>
-            <a:r>
-              <a:rPr lang="en-US" dirty="0" smtClean="0"/>
-              <a:t>snapshots</a:t>
-            </a:r>
-            <a:endParaRPr lang="en-US" dirty="0"/>
-          </a:p>
-        </p:txBody>
-      </p:sp>
-    </p:spTree>
-    <p:extLst>
-      <p:ext uri="{BB962C8B-B14F-4D97-AF65-F5344CB8AC3E}">
-        <p14:creationId xmlns:p14="http://schemas.microsoft.com/office/powerpoint/2010/main" val="3981756651"/>
-      </p:ext>
-    </p:extLst>
-  </p:cSld>
-  <p:clrMapOvr>
-    <a:masterClrMapping/>
-  </p:clrMapOvr>
-</p:sld>
-</file>
-
-<file path=ppt/slides/slide15.xml><?xml version="1.0" encoding="utf-8"?>
-<p:sld xmlns:a="http://schemas.openxmlformats.org/drawingml/2006/main" xmlns:r="http://schemas.openxmlformats.org/officeDocument/2006/relationships" xmlns:p="http://schemas.openxmlformats.org/presentationml/2006/main">
-  <p:cSld>
-    <p:spTree>
-      <p:nvGrpSpPr>
-        <p:cNvPr id="1" name=""/>
-        <p:cNvGrpSpPr/>
-        <p:nvPr/>
-      </p:nvGrpSpPr>
-      <p:grpSpPr>
-        <a:xfrm>
-          <a:off x="0" y="0"/>
-          <a:ext cx="0" cy="0"/>
-          <a:chOff x="0" y="0"/>
-          <a:chExt cx="0" cy="0"/>
-        </a:xfrm>
-      </p:grpSpPr>
-      <p:sp>
-        <p:nvSpPr>
-          <p:cNvPr id="2" name="Title 1"/>
-          <p:cNvSpPr>
-            <a:spLocks noGrp="1"/>
-          </p:cNvSpPr>
-          <p:nvPr>
-            <p:ph type="title"/>
-          </p:nvPr>
-        </p:nvSpPr>
-        <p:spPr/>
-        <p:txBody>
-          <a:bodyPr/>
-          <a:lstStyle/>
-          <a:p>
-            <a:r>
-              <a:rPr lang="en-US" dirty="0" smtClean="0"/>
-              <a:t>Code Features</a:t>
-            </a:r>
-            <a:endParaRPr lang="en-US" dirty="0"/>
-          </a:p>
-        </p:txBody>
-      </p:sp>
-      <p:sp>
-        <p:nvSpPr>
-          <p:cNvPr id="3" name="Content Placeholder 2"/>
-          <p:cNvSpPr>
-            <a:spLocks noGrp="1"/>
-          </p:cNvSpPr>
-          <p:nvPr>
-            <p:ph idx="1"/>
-          </p:nvPr>
-        </p:nvSpPr>
-        <p:spPr/>
-        <p:txBody>
-          <a:bodyPr>
-            <a:normAutofit lnSpcReduction="10000"/>
-          </a:bodyPr>
-          <a:lstStyle/>
-          <a:p>
-            <a:r>
-              <a:rPr lang="en-US" dirty="0"/>
-              <a:t>The MD program should be able to stably run for an arbitrary length of time on an arbitrary </a:t>
-            </a:r>
-            <a:r>
-              <a:rPr lang="en-US" dirty="0" smtClean="0"/>
-              <a:t>number of processors. The </a:t>
-            </a:r>
-            <a:r>
-              <a:rPr lang="en-US" dirty="0"/>
-              <a:t>MD program should be able to print out binary ﬁles that can be visualized using VMD or </a:t>
-            </a:r>
-            <a:r>
-              <a:rPr lang="en-US" dirty="0" smtClean="0"/>
-              <a:t>other visualization </a:t>
-            </a:r>
-            <a:r>
-              <a:rPr lang="en-US" dirty="0"/>
-              <a:t>programs that exist, as well as xml </a:t>
-            </a:r>
-            <a:r>
-              <a:rPr lang="en-US" dirty="0" smtClean="0"/>
-              <a:t>snapshots</a:t>
-            </a:r>
+              <a:t>programs that </a:t>
+            </a:r>
+            <a:r>
+              <a:rPr lang="en-US" dirty="0" smtClean="0"/>
+              <a:t>exist</a:t>
+            </a:r>
+            <a:endParaRPr lang="en-US" dirty="0" smtClean="0"/>
           </a:p>
           <a:p>
             <a:r>
@@ -5231,134 +4998,7 @@
 </p:sld>
 </file>
 
-<file path=ppt/slides/slide16.xml><?xml version="1.0" encoding="utf-8"?>
-<p:sld xmlns:a="http://schemas.openxmlformats.org/drawingml/2006/main" xmlns:r="http://schemas.openxmlformats.org/officeDocument/2006/relationships" xmlns:p="http://schemas.openxmlformats.org/presentationml/2006/main">
-  <p:cSld>
-    <p:spTree>
-      <p:nvGrpSpPr>
-        <p:cNvPr id="1" name=""/>
-        <p:cNvGrpSpPr/>
-        <p:nvPr/>
-      </p:nvGrpSpPr>
-      <p:grpSpPr>
-        <a:xfrm>
-          <a:off x="0" y="0"/>
-          <a:ext cx="0" cy="0"/>
-          <a:chOff x="0" y="0"/>
-          <a:chExt cx="0" cy="0"/>
-        </a:xfrm>
-      </p:grpSpPr>
-      <p:sp>
-        <p:nvSpPr>
-          <p:cNvPr id="2" name="Title 1"/>
-          <p:cNvSpPr>
-            <a:spLocks noGrp="1"/>
-          </p:cNvSpPr>
-          <p:nvPr>
-            <p:ph type="title"/>
-          </p:nvPr>
-        </p:nvSpPr>
-        <p:spPr/>
-        <p:txBody>
-          <a:bodyPr/>
-          <a:lstStyle/>
-          <a:p>
-            <a:r>
-              <a:rPr lang="en-US" dirty="0" smtClean="0"/>
-              <a:t>Code Features</a:t>
-            </a:r>
-            <a:endParaRPr lang="en-US" dirty="0"/>
-          </a:p>
-        </p:txBody>
-      </p:sp>
-      <p:sp>
-        <p:nvSpPr>
-          <p:cNvPr id="3" name="Content Placeholder 2"/>
-          <p:cNvSpPr>
-            <a:spLocks noGrp="1"/>
-          </p:cNvSpPr>
-          <p:nvPr>
-            <p:ph idx="1"/>
-          </p:nvPr>
-        </p:nvSpPr>
-        <p:spPr/>
-        <p:txBody>
-          <a:bodyPr>
-            <a:normAutofit fontScale="85000" lnSpcReduction="20000"/>
-          </a:bodyPr>
-          <a:lstStyle/>
-          <a:p>
-            <a:r>
-              <a:rPr lang="en-US" dirty="0"/>
-              <a:t>The MD program should able to be started using two mechanisms. First, through reading an </a:t>
-            </a:r>
-            <a:r>
-              <a:rPr lang="en-US" dirty="0" smtClean="0"/>
-              <a:t>xml-based input </a:t>
-            </a:r>
-            <a:r>
-              <a:rPr lang="en-US" dirty="0"/>
-              <a:t>ﬁle, or by using a python script with an easily usable user </a:t>
-            </a:r>
-            <a:r>
-              <a:rPr lang="en-US" dirty="0" smtClean="0"/>
-              <a:t>interface</a:t>
-            </a:r>
-          </a:p>
-          <a:p>
-            <a:r>
-              <a:rPr lang="en-US" dirty="0"/>
-              <a:t>The MD program should write a checkpoint ﬁle after every so many iterations so that a simulation </a:t>
-            </a:r>
-            <a:r>
-              <a:rPr lang="en-US" dirty="0" smtClean="0"/>
-              <a:t>can pick </a:t>
-            </a:r>
-            <a:r>
-              <a:rPr lang="en-US" dirty="0"/>
-              <a:t>up where it left oﬀ in case of power failure, system failure, or running out of </a:t>
-            </a:r>
-            <a:r>
-              <a:rPr lang="en-US" dirty="0" err="1" smtClean="0"/>
-              <a:t>walltime</a:t>
-            </a:r>
-            <a:endParaRPr lang="en-US" dirty="0" smtClean="0"/>
-          </a:p>
-          <a:p>
-            <a:r>
-              <a:rPr lang="en-US" dirty="0"/>
-              <a:t>The ﬁnal version should be able to handle bonds of an arbitrary nature as long as they conform to </a:t>
-            </a:r>
-            <a:r>
-              <a:rPr lang="en-US" dirty="0" smtClean="0"/>
-              <a:t>the bond </a:t>
-            </a:r>
-            <a:r>
-              <a:rPr lang="en-US" dirty="0"/>
-              <a:t>abstract base class. Because of this feature, our MD code can be extended to arbitrarily </a:t>
-            </a:r>
-            <a:r>
-              <a:rPr lang="en-US" dirty="0" smtClean="0"/>
-              <a:t>complex molecules</a:t>
-            </a:r>
-            <a:endParaRPr lang="en-US" dirty="0"/>
-          </a:p>
-        </p:txBody>
-      </p:sp>
-    </p:spTree>
-    <p:extLst>
-      <p:ext uri="{BB962C8B-B14F-4D97-AF65-F5344CB8AC3E}">
-        <p14:creationId xmlns:p14="http://schemas.microsoft.com/office/powerpoint/2010/main" val="1949845610"/>
-      </p:ext>
-    </p:extLst>
-  </p:cSld>
-  <p:clrMapOvr>
-    <a:masterClrMapping/>
-  </p:clrMapOvr>
-</p:sld>
-</file>
-
-<file path=ppt/slides/slide17.xml><?xml version="1.0" encoding="utf-8"?>
+<file path=ppt/slides/slide15.xml><?xml version="1.0" encoding="utf-8"?>
 <p:sld xmlns:a="http://schemas.openxmlformats.org/drawingml/2006/main" xmlns:r="http://schemas.openxmlformats.org/officeDocument/2006/relationships" xmlns:p="http://schemas.openxmlformats.org/presentationml/2006/main">
   <p:cSld>
     <p:spTree>
@@ -5518,8 +5158,13 @@
             <a:pPr lvl="1"/>
             <a:r>
               <a:rPr lang="en-US" dirty="0" smtClean="0"/>
-              <a:t>Evaluate properties that would be difficult to do at more extreme experimental conditions</a:t>
-            </a:r>
+              <a:t>Evaluate properties that would be difficult to do </a:t>
+            </a:r>
+            <a:r>
+              <a:rPr lang="en-US" dirty="0" smtClean="0"/>
+              <a:t>experimentally</a:t>
+            </a:r>
+            <a:endParaRPr lang="en-US" dirty="0" smtClean="0"/>
           </a:p>
           <a:p>
             <a:r>
@@ -5550,1004 +5195,6 @@
 </file>
 
 <file path=ppt/slides/slide3.xml><?xml version="1.0" encoding="utf-8"?>
-<p:sld xmlns:a="http://schemas.openxmlformats.org/drawingml/2006/main" xmlns:r="http://schemas.openxmlformats.org/officeDocument/2006/relationships" xmlns:p="http://schemas.openxmlformats.org/presentationml/2006/main">
-  <p:cSld>
-    <p:spTree>
-      <p:nvGrpSpPr>
-        <p:cNvPr id="1" name=""/>
-        <p:cNvGrpSpPr/>
-        <p:nvPr/>
-      </p:nvGrpSpPr>
-      <p:grpSpPr>
-        <a:xfrm>
-          <a:off x="0" y="0"/>
-          <a:ext cx="0" cy="0"/>
-          <a:chOff x="0" y="0"/>
-          <a:chExt cx="0" cy="0"/>
-        </a:xfrm>
-      </p:grpSpPr>
-      <p:sp>
-        <p:nvSpPr>
-          <p:cNvPr id="2" name="Title 1"/>
-          <p:cNvSpPr>
-            <a:spLocks noGrp="1"/>
-          </p:cNvSpPr>
-          <p:nvPr>
-            <p:ph type="title"/>
-          </p:nvPr>
-        </p:nvSpPr>
-        <p:spPr/>
-        <p:txBody>
-          <a:bodyPr/>
-          <a:lstStyle/>
-          <a:p>
-            <a:r>
-              <a:rPr lang="en-US" dirty="0" smtClean="0"/>
-              <a:t>Background on MD</a:t>
-            </a:r>
-            <a:endParaRPr lang="en-US" dirty="0"/>
-          </a:p>
-        </p:txBody>
-      </p:sp>
-      <mc:AlternateContent xmlns:mc="http://schemas.openxmlformats.org/markup-compatibility/2006">
-        <mc:Choice xmlns:a14="http://schemas.microsoft.com/office/drawing/2010/main" Requires="a14">
-          <p:sp>
-            <p:nvSpPr>
-              <p:cNvPr id="3" name="Content Placeholder 2"/>
-              <p:cNvSpPr>
-                <a:spLocks noGrp="1"/>
-              </p:cNvSpPr>
-              <p:nvPr>
-                <p:ph idx="1"/>
-              </p:nvPr>
-            </p:nvSpPr>
-            <p:spPr/>
-            <p:txBody>
-              <a:bodyPr>
-                <a:normAutofit fontScale="85000" lnSpcReduction="20000"/>
-              </a:bodyPr>
-              <a:lstStyle/>
-              <a:p>
-                <a:r>
-                  <a:rPr lang="en-US" dirty="0" smtClean="0"/>
-                  <a:t>Initialize system of particles (atoms, molecules, other molecular-scale group)</a:t>
-                </a:r>
-              </a:p>
-              <a:p>
-                <a:r>
-                  <a:rPr lang="en-US" dirty="0" smtClean="0"/>
-                  <a:t>Given interaction potential V(r), MD integrated Newton’s equation of motion, </a:t>
-                </a:r>
-                <a14:m>
-                  <m:oMath xmlns:m="http://schemas.openxmlformats.org/officeDocument/2006/math">
-                    <m:acc>
-                      <m:accPr>
-                        <m:chr m:val="⃑"/>
-                        <m:ctrlPr>
-                          <a:rPr lang="en-US" i="1">
-                            <a:latin typeface="Cambria Math"/>
-                          </a:rPr>
-                        </m:ctrlPr>
-                      </m:accPr>
-                      <m:e>
-                        <m:r>
-                          <a:rPr lang="en-US" i="1">
-                            <a:latin typeface="Cambria Math"/>
-                          </a:rPr>
-                          <m:t>𝐹</m:t>
-                        </m:r>
-                      </m:e>
-                    </m:acc>
-                    <m:r>
-                      <a:rPr lang="en-US" i="1">
-                        <a:latin typeface="Cambria Math"/>
-                      </a:rPr>
-                      <m:t>=</m:t>
-                    </m:r>
-                    <m:r>
-                      <a:rPr lang="en-US" i="1">
-                        <a:latin typeface="Cambria Math"/>
-                      </a:rPr>
-                      <m:t>𝑚</m:t>
-                    </m:r>
-                    <m:acc>
-                      <m:accPr>
-                        <m:chr m:val="⃑"/>
-                        <m:ctrlPr>
-                          <a:rPr lang="en-US" i="1">
-                            <a:latin typeface="Cambria Math"/>
-                          </a:rPr>
-                        </m:ctrlPr>
-                      </m:accPr>
-                      <m:e>
-                        <m:r>
-                          <a:rPr lang="en-US" i="1">
-                            <a:latin typeface="Cambria Math"/>
-                          </a:rPr>
-                          <m:t>𝑎</m:t>
-                        </m:r>
-                      </m:e>
-                    </m:acc>
-                  </m:oMath>
-                </a14:m>
-                <a:r>
-                  <a:rPr lang="en-US" dirty="0" smtClean="0"/>
-                  <a:t> over time</a:t>
-                </a:r>
-              </a:p>
-              <a:p>
-                <a:r>
-                  <a:rPr lang="en-US" dirty="0" smtClean="0"/>
-                  <a:t>Program flow</a:t>
-                </a:r>
-              </a:p>
-              <a:p>
-                <a:pPr marL="971550" lvl="1" indent="-514350">
-                  <a:buFont typeface="+mj-lt"/>
-                  <a:buAutoNum type="arabicPeriod"/>
-                </a:pPr>
-                <a:r>
-                  <a:rPr lang="en-US" dirty="0" smtClean="0"/>
-                  <a:t>Initialize positions and choose timestep </a:t>
-                </a:r>
-                <a:r>
-                  <a:rPr lang="en-US" dirty="0" err="1" smtClean="0"/>
-                  <a:t>dt</a:t>
-                </a:r>
-                <a:endParaRPr lang="en-US" dirty="0"/>
-              </a:p>
-              <a:p>
-                <a:pPr marL="971550" lvl="1" indent="-514350">
-                  <a:buFont typeface="+mj-lt"/>
-                  <a:buAutoNum type="arabicPeriod"/>
-                </a:pPr>
-                <a:r>
-                  <a:rPr lang="en-US" dirty="0" smtClean="0"/>
-                  <a:t>Calculate forces </a:t>
-                </a:r>
-                <a14:m>
-                  <m:oMath xmlns:m="http://schemas.openxmlformats.org/officeDocument/2006/math">
-                    <m:acc>
-                      <m:accPr>
-                        <m:chr m:val="⃑"/>
-                        <m:ctrlPr>
-                          <a:rPr lang="en-US" i="1" dirty="0" smtClean="0">
-                            <a:latin typeface="Cambria Math"/>
-                          </a:rPr>
-                        </m:ctrlPr>
-                      </m:accPr>
-                      <m:e>
-                        <m:r>
-                          <a:rPr lang="en-US" i="1" dirty="0">
-                            <a:latin typeface="Cambria Math"/>
-                          </a:rPr>
-                          <m:t>𝐹</m:t>
-                        </m:r>
-                      </m:e>
-                    </m:acc>
-                  </m:oMath>
-                </a14:m>
-                <a:r>
-                  <a:rPr lang="en-US" dirty="0" smtClean="0"/>
-                  <a:t>=-</a:t>
-                </a:r>
-                <a14:m>
-                  <m:oMath xmlns:m="http://schemas.openxmlformats.org/officeDocument/2006/math">
-                    <m:r>
-                      <a:rPr lang="en-US" i="1" smtClean="0">
-                        <a:latin typeface="Cambria Math"/>
-                        <a:ea typeface="Cambria Math"/>
-                      </a:rPr>
-                      <m:t>∇</m:t>
-                    </m:r>
-                    <m:r>
-                      <a:rPr lang="en-US" b="0" i="1" smtClean="0">
-                        <a:latin typeface="Cambria Math"/>
-                        <a:ea typeface="Cambria Math"/>
-                      </a:rPr>
-                      <m:t>𝑉</m:t>
-                    </m:r>
-                  </m:oMath>
-                </a14:m>
-                <a:r>
-                  <a:rPr lang="en-US" dirty="0" smtClean="0"/>
-                  <a:t>(</a:t>
-                </a:r>
-                <a14:m>
-                  <m:oMath xmlns:m="http://schemas.openxmlformats.org/officeDocument/2006/math">
-                    <m:acc>
-                      <m:accPr>
-                        <m:chr m:val="⃑"/>
-                        <m:ctrlPr>
-                          <a:rPr lang="en-US" i="1" dirty="0" smtClean="0">
-                            <a:latin typeface="Cambria Math"/>
-                          </a:rPr>
-                        </m:ctrlPr>
-                      </m:accPr>
-                      <m:e>
-                        <m:r>
-                          <a:rPr lang="en-US" i="1" dirty="0">
-                            <a:latin typeface="Cambria Math"/>
-                          </a:rPr>
-                          <m:t>𝑟</m:t>
-                        </m:r>
-                      </m:e>
-                    </m:acc>
-                  </m:oMath>
-                </a14:m>
-                <a:r>
-                  <a:rPr lang="en-US" dirty="0" smtClean="0"/>
-                  <a:t>)</a:t>
-                </a:r>
-              </a:p>
-              <a:p>
-                <a:pPr marL="971550" lvl="1" indent="-514350">
-                  <a:buFont typeface="+mj-lt"/>
-                  <a:buAutoNum type="arabicPeriod"/>
-                </a:pPr>
-                <a:r>
-                  <a:rPr lang="en-US" dirty="0" smtClean="0"/>
-                  <a:t>Numerically integrate to calculate the displacement over </a:t>
-                </a:r>
-                <a:r>
-                  <a:rPr lang="en-US" i="1" dirty="0" err="1" smtClean="0"/>
-                  <a:t>dt</a:t>
-                </a:r>
-                <a:r>
-                  <a:rPr lang="en-US" dirty="0" smtClean="0"/>
-                  <a:t> using </a:t>
-                </a:r>
-                <a14:m>
-                  <m:oMath xmlns:m="http://schemas.openxmlformats.org/officeDocument/2006/math">
-                    <m:acc>
-                      <m:accPr>
-                        <m:chr m:val="⃑"/>
-                        <m:ctrlPr>
-                          <a:rPr lang="en-US" b="0" i="1" smtClean="0">
-                            <a:latin typeface="Cambria Math"/>
-                          </a:rPr>
-                        </m:ctrlPr>
-                      </m:accPr>
-                      <m:e>
-                        <m:r>
-                          <a:rPr lang="en-US" i="1">
-                            <a:latin typeface="Cambria Math"/>
-                          </a:rPr>
-                          <m:t>𝐹</m:t>
-                        </m:r>
-                      </m:e>
-                    </m:acc>
-                    <m:r>
-                      <a:rPr lang="en-US" b="0" i="1" smtClean="0">
-                        <a:latin typeface="Cambria Math"/>
-                      </a:rPr>
-                      <m:t>=</m:t>
-                    </m:r>
-                    <m:r>
-                      <a:rPr lang="en-US" b="0" i="1" smtClean="0">
-                        <a:latin typeface="Cambria Math"/>
-                      </a:rPr>
-                      <m:t>𝑚</m:t>
-                    </m:r>
-                    <m:acc>
-                      <m:accPr>
-                        <m:chr m:val="⃑"/>
-                        <m:ctrlPr>
-                          <a:rPr lang="en-US" b="0" i="1" smtClean="0">
-                            <a:latin typeface="Cambria Math"/>
-                          </a:rPr>
-                        </m:ctrlPr>
-                      </m:accPr>
-                      <m:e>
-                        <m:r>
-                          <a:rPr lang="en-US" i="1">
-                            <a:latin typeface="Cambria Math"/>
-                          </a:rPr>
-                          <m:t>𝑎</m:t>
-                        </m:r>
-                      </m:e>
-                    </m:acc>
-                    <m:r>
-                      <a:rPr lang="en-US" b="0" i="1" smtClean="0">
-                        <a:latin typeface="Cambria Math"/>
-                      </a:rPr>
-                      <m:t>, </m:t>
-                    </m:r>
-                    <m:r>
-                      <a:rPr lang="en-US" b="0" i="1" smtClean="0">
-                        <a:latin typeface="Cambria Math"/>
-                      </a:rPr>
-                      <m:t>𝑎</m:t>
-                    </m:r>
-                    <m:r>
-                      <a:rPr lang="en-US" b="0" i="1" smtClean="0">
-                        <a:latin typeface="Cambria Math"/>
-                      </a:rPr>
-                      <m:t>=</m:t>
-                    </m:r>
-                    <m:f>
-                      <m:fPr>
-                        <m:ctrlPr>
-                          <a:rPr lang="en-US" i="1">
-                            <a:latin typeface="Cambria Math"/>
-                          </a:rPr>
-                        </m:ctrlPr>
-                      </m:fPr>
-                      <m:num>
-                        <m:r>
-                          <a:rPr lang="en-US" i="1">
-                            <a:latin typeface="Cambria Math"/>
-                          </a:rPr>
-                          <m:t>𝑑</m:t>
-                        </m:r>
-                        <m:acc>
-                          <m:accPr>
-                            <m:chr m:val="⃑"/>
-                            <m:ctrlPr>
-                              <a:rPr lang="en-US" b="0" i="1" smtClean="0">
-                                <a:latin typeface="Cambria Math"/>
-                              </a:rPr>
-                            </m:ctrlPr>
-                          </m:accPr>
-                          <m:e>
-                            <m:r>
-                              <a:rPr lang="en-US" i="1">
-                                <a:latin typeface="Cambria Math"/>
-                              </a:rPr>
-                              <m:t>𝑣</m:t>
-                            </m:r>
-                          </m:e>
-                        </m:acc>
-                      </m:num>
-                      <m:den>
-                        <m:r>
-                          <a:rPr lang="en-US" i="1">
-                            <a:latin typeface="Cambria Math"/>
-                          </a:rPr>
-                          <m:t>𝑑𝑡</m:t>
-                        </m:r>
-                      </m:den>
-                    </m:f>
-                    <m:r>
-                      <a:rPr lang="en-US" b="0" i="1" smtClean="0">
-                        <a:latin typeface="Cambria Math"/>
-                      </a:rPr>
-                      <m:t>, </m:t>
-                    </m:r>
-                    <m:r>
-                      <a:rPr lang="en-US" b="0" i="1" smtClean="0">
-                        <a:latin typeface="Cambria Math"/>
-                      </a:rPr>
-                      <m:t>𝑎𝑛𝑑</m:t>
-                    </m:r>
-                    <m:r>
-                      <a:rPr lang="en-US" b="0" i="1" smtClean="0">
-                        <a:latin typeface="Cambria Math"/>
-                      </a:rPr>
-                      <m:t> </m:t>
-                    </m:r>
-                    <m:acc>
-                      <m:accPr>
-                        <m:chr m:val="⃑"/>
-                        <m:ctrlPr>
-                          <a:rPr lang="en-US" b="0" i="1" smtClean="0">
-                            <a:latin typeface="Cambria Math"/>
-                          </a:rPr>
-                        </m:ctrlPr>
-                      </m:accPr>
-                      <m:e>
-                        <m:r>
-                          <a:rPr lang="en-US" i="1">
-                            <a:latin typeface="Cambria Math"/>
-                          </a:rPr>
-                          <m:t>𝑣</m:t>
-                        </m:r>
-                      </m:e>
-                    </m:acc>
-                    <m:r>
-                      <a:rPr lang="en-US" b="0" i="1" smtClean="0">
-                        <a:latin typeface="Cambria Math"/>
-                      </a:rPr>
-                      <m:t>=</m:t>
-                    </m:r>
-                    <m:f>
-                      <m:fPr>
-                        <m:ctrlPr>
-                          <a:rPr lang="en-US" b="0" i="1" smtClean="0">
-                            <a:latin typeface="Cambria Math"/>
-                          </a:rPr>
-                        </m:ctrlPr>
-                      </m:fPr>
-                      <m:num>
-                        <m:r>
-                          <a:rPr lang="en-US" b="0" i="1" smtClean="0">
-                            <a:latin typeface="Cambria Math"/>
-                          </a:rPr>
-                          <m:t>𝑑</m:t>
-                        </m:r>
-                        <m:acc>
-                          <m:accPr>
-                            <m:chr m:val="⃑"/>
-                            <m:ctrlPr>
-                              <a:rPr lang="en-US" b="0" i="1" smtClean="0">
-                                <a:latin typeface="Cambria Math"/>
-                              </a:rPr>
-                            </m:ctrlPr>
-                          </m:accPr>
-                          <m:e>
-                            <m:r>
-                              <a:rPr lang="en-US" i="1">
-                                <a:latin typeface="Cambria Math"/>
-                              </a:rPr>
-                              <m:t>𝑟</m:t>
-                            </m:r>
-                          </m:e>
-                        </m:acc>
-                      </m:num>
-                      <m:den>
-                        <m:r>
-                          <a:rPr lang="en-US" b="0" i="1" smtClean="0">
-                            <a:latin typeface="Cambria Math"/>
-                          </a:rPr>
-                          <m:t>𝑑𝑡</m:t>
-                        </m:r>
-                      </m:den>
-                    </m:f>
-                  </m:oMath>
-                </a14:m>
-                <a:endParaRPr lang="en-US" dirty="0" smtClean="0"/>
-              </a:p>
-              <a:p>
-                <a:pPr marL="971550" lvl="1" indent="-514350">
-                  <a:buFont typeface="+mj-lt"/>
-                  <a:buAutoNum type="arabicPeriod"/>
-                </a:pPr>
-                <a:r>
-                  <a:rPr lang="en-US" dirty="0" smtClean="0"/>
-                  <a:t>Update positions and time</a:t>
-                </a:r>
-              </a:p>
-              <a:p>
-                <a:pPr marL="971550" lvl="1" indent="-514350">
-                  <a:buFont typeface="+mj-lt"/>
-                  <a:buAutoNum type="arabicPeriod"/>
-                </a:pPr>
-                <a:r>
-                  <a:rPr lang="en-US" dirty="0" smtClean="0"/>
-                  <a:t>Repeat from step 2 until final time</a:t>
-                </a:r>
-              </a:p>
-            </p:txBody>
-          </p:sp>
-        </mc:Choice>
-        <mc:Fallback>
-          <p:sp>
-            <p:nvSpPr>
-              <p:cNvPr id="3" name="Content Placeholder 2"/>
-              <p:cNvSpPr>
-                <a:spLocks noGrp="1" noRot="1" noChangeAspect="1" noMove="1" noResize="1" noEditPoints="1" noAdjustHandles="1" noChangeArrowheads="1" noChangeShapeType="1" noTextEdit="1"/>
-              </p:cNvSpPr>
-              <p:nvPr>
-                <p:ph idx="1"/>
-              </p:nvPr>
-            </p:nvSpPr>
-            <p:spPr>
-              <a:blipFill rotWithShape="1">
-                <a:blip r:embed="rId2"/>
-                <a:stretch>
-                  <a:fillRect l="-1185" t="-2695" r="-815"/>
-                </a:stretch>
-              </a:blipFill>
-            </p:spPr>
-            <p:txBody>
-              <a:bodyPr/>
-              <a:lstStyle/>
-              <a:p>
-                <a:r>
-                  <a:rPr lang="en-US">
-                    <a:noFill/>
-                  </a:rPr>
-                  <a:t> </a:t>
-                </a:r>
-              </a:p>
-            </p:txBody>
-          </p:sp>
-        </mc:Fallback>
-      </mc:AlternateContent>
-    </p:spTree>
-    <p:extLst>
-      <p:ext uri="{BB962C8B-B14F-4D97-AF65-F5344CB8AC3E}">
-        <p14:creationId xmlns:p14="http://schemas.microsoft.com/office/powerpoint/2010/main" val="4056327238"/>
-      </p:ext>
-    </p:extLst>
-  </p:cSld>
-  <p:clrMapOvr>
-    <a:masterClrMapping/>
-  </p:clrMapOvr>
-</p:sld>
-</file>
-
-<file path=ppt/slides/slide4.xml><?xml version="1.0" encoding="utf-8"?>
-<p:sld xmlns:a="http://schemas.openxmlformats.org/drawingml/2006/main" xmlns:r="http://schemas.openxmlformats.org/officeDocument/2006/relationships" xmlns:p="http://schemas.openxmlformats.org/presentationml/2006/main">
-  <p:cSld>
-    <p:spTree>
-      <p:nvGrpSpPr>
-        <p:cNvPr id="1" name=""/>
-        <p:cNvGrpSpPr/>
-        <p:nvPr/>
-      </p:nvGrpSpPr>
-      <p:grpSpPr>
-        <a:xfrm>
-          <a:off x="0" y="0"/>
-          <a:ext cx="0" cy="0"/>
-          <a:chOff x="0" y="0"/>
-          <a:chExt cx="0" cy="0"/>
-        </a:xfrm>
-      </p:grpSpPr>
-      <p:sp>
-        <p:nvSpPr>
-          <p:cNvPr id="2" name="Title 1"/>
-          <p:cNvSpPr>
-            <a:spLocks noGrp="1"/>
-          </p:cNvSpPr>
-          <p:nvPr>
-            <p:ph type="title"/>
-          </p:nvPr>
-        </p:nvSpPr>
-        <p:spPr/>
-        <p:txBody>
-          <a:bodyPr/>
-          <a:lstStyle/>
-          <a:p>
-            <a:r>
-              <a:rPr lang="en-US" dirty="0" smtClean="0"/>
-              <a:t>Background on MD</a:t>
-            </a:r>
-            <a:endParaRPr lang="en-US" dirty="0"/>
-          </a:p>
-        </p:txBody>
-      </p:sp>
-      <p:sp>
-        <p:nvSpPr>
-          <p:cNvPr id="3" name="Content Placeholder 2"/>
-          <p:cNvSpPr>
-            <a:spLocks noGrp="1"/>
-          </p:cNvSpPr>
-          <p:nvPr>
-            <p:ph idx="1"/>
-          </p:nvPr>
-        </p:nvSpPr>
-        <p:spPr/>
-        <p:txBody>
-          <a:bodyPr/>
-          <a:lstStyle/>
-          <a:p>
-            <a:r>
-              <a:rPr lang="en-US" dirty="0" smtClean="0"/>
-              <a:t>Users need to provide </a:t>
-            </a:r>
-          </a:p>
-          <a:p>
-            <a:pPr lvl="1"/>
-            <a:r>
-              <a:rPr lang="en-US" dirty="0"/>
-              <a:t>I</a:t>
-            </a:r>
-            <a:r>
-              <a:rPr lang="en-US" dirty="0" smtClean="0"/>
-              <a:t>nitial configuration (coordinates and velocities) of particles</a:t>
-            </a:r>
-          </a:p>
-          <a:p>
-            <a:pPr lvl="1"/>
-            <a:r>
-              <a:rPr lang="en-US" dirty="0" smtClean="0"/>
-              <a:t>Choice of relevant potential function</a:t>
-            </a:r>
-          </a:p>
-          <a:p>
-            <a:pPr lvl="2"/>
-            <a:r>
-              <a:rPr lang="en-US" dirty="0" smtClean="0"/>
-              <a:t>Van der Waals, electrostatics</a:t>
-            </a:r>
-          </a:p>
-          <a:p>
-            <a:pPr lvl="1"/>
-            <a:r>
-              <a:rPr lang="en-US" dirty="0" smtClean="0"/>
-              <a:t>Timestep ~ femtosecond and simulation length</a:t>
-            </a:r>
-            <a:endParaRPr lang="en-US" dirty="0"/>
-          </a:p>
-        </p:txBody>
-      </p:sp>
-    </p:spTree>
-    <p:extLst>
-      <p:ext uri="{BB962C8B-B14F-4D97-AF65-F5344CB8AC3E}">
-        <p14:creationId xmlns:p14="http://schemas.microsoft.com/office/powerpoint/2010/main" val="139455933"/>
-      </p:ext>
-    </p:extLst>
-  </p:cSld>
-  <p:clrMapOvr>
-    <a:masterClrMapping/>
-  </p:clrMapOvr>
-</p:sld>
-</file>
-
-<file path=ppt/slides/slide5.xml><?xml version="1.0" encoding="utf-8"?>
-<p:sld xmlns:a="http://schemas.openxmlformats.org/drawingml/2006/main" xmlns:r="http://schemas.openxmlformats.org/officeDocument/2006/relationships" xmlns:p="http://schemas.openxmlformats.org/presentationml/2006/main">
-  <p:cSld>
-    <p:spTree>
-      <p:nvGrpSpPr>
-        <p:cNvPr id="1" name=""/>
-        <p:cNvGrpSpPr/>
-        <p:nvPr/>
-      </p:nvGrpSpPr>
-      <p:grpSpPr>
-        <a:xfrm>
-          <a:off x="0" y="0"/>
-          <a:ext cx="0" cy="0"/>
-          <a:chOff x="0" y="0"/>
-          <a:chExt cx="0" cy="0"/>
-        </a:xfrm>
-      </p:grpSpPr>
-      <p:sp>
-        <p:nvSpPr>
-          <p:cNvPr id="2" name="Title 1"/>
-          <p:cNvSpPr>
-            <a:spLocks noGrp="1"/>
-          </p:cNvSpPr>
-          <p:nvPr>
-            <p:ph type="title"/>
-          </p:nvPr>
-        </p:nvSpPr>
-        <p:spPr/>
-        <p:txBody>
-          <a:bodyPr/>
-          <a:lstStyle/>
-          <a:p>
-            <a:r>
-              <a:rPr lang="en-US" dirty="0" smtClean="0"/>
-              <a:t>Ensembles in MD</a:t>
-            </a:r>
-            <a:endParaRPr lang="en-US" dirty="0"/>
-          </a:p>
-        </p:txBody>
-      </p:sp>
-      <p:sp>
-        <p:nvSpPr>
-          <p:cNvPr id="3" name="Content Placeholder 2"/>
-          <p:cNvSpPr>
-            <a:spLocks noGrp="1"/>
-          </p:cNvSpPr>
-          <p:nvPr>
-            <p:ph idx="1"/>
-          </p:nvPr>
-        </p:nvSpPr>
-        <p:spPr/>
-        <p:txBody>
-          <a:bodyPr/>
-          <a:lstStyle/>
-          <a:p>
-            <a:r>
-              <a:rPr lang="en-US" dirty="0" smtClean="0"/>
-              <a:t>NVE: (</a:t>
-            </a:r>
-            <a:r>
-              <a:rPr lang="en-US" dirty="0" err="1" smtClean="0"/>
-              <a:t>Microcanonical</a:t>
-            </a:r>
-            <a:r>
-              <a:rPr lang="en-US" dirty="0" smtClean="0"/>
-              <a:t>) Constant Energy (E), Volume (V), and number of particles (N)</a:t>
-            </a:r>
-          </a:p>
-          <a:p>
-            <a:r>
-              <a:rPr lang="en-US" dirty="0" smtClean="0"/>
-              <a:t>NVT (Canonical) </a:t>
-            </a:r>
-          </a:p>
-          <a:p>
-            <a:pPr lvl="1"/>
-            <a:r>
-              <a:rPr lang="en-US" dirty="0" smtClean="0"/>
-              <a:t>Constant Temperature (T)</a:t>
-            </a:r>
-          </a:p>
-          <a:p>
-            <a:r>
-              <a:rPr lang="en-US" dirty="0" smtClean="0"/>
-              <a:t>NPT (isothermal-isobaric) </a:t>
-            </a:r>
-          </a:p>
-          <a:p>
-            <a:pPr lvl="1"/>
-            <a:r>
-              <a:rPr lang="en-US" dirty="0" smtClean="0"/>
-              <a:t>Constant Pressure (P)</a:t>
-            </a:r>
-          </a:p>
-          <a:p>
-            <a:pPr lvl="1"/>
-            <a:r>
-              <a:rPr lang="en-US" dirty="0" smtClean="0"/>
-              <a:t>Most similar to experimental conditions</a:t>
-            </a:r>
-            <a:endParaRPr lang="en-US" dirty="0"/>
-          </a:p>
-        </p:txBody>
-      </p:sp>
-    </p:spTree>
-    <p:extLst>
-      <p:ext uri="{BB962C8B-B14F-4D97-AF65-F5344CB8AC3E}">
-        <p14:creationId xmlns:p14="http://schemas.microsoft.com/office/powerpoint/2010/main" val="446223969"/>
-      </p:ext>
-    </p:extLst>
-  </p:cSld>
-  <p:clrMapOvr>
-    <a:masterClrMapping/>
-  </p:clrMapOvr>
-</p:sld>
-</file>
-
-<file path=ppt/slides/slide6.xml><?xml version="1.0" encoding="utf-8"?>
-<p:sld xmlns:a="http://schemas.openxmlformats.org/drawingml/2006/main" xmlns:r="http://schemas.openxmlformats.org/officeDocument/2006/relationships" xmlns:p="http://schemas.openxmlformats.org/presentationml/2006/main">
-  <p:cSld>
-    <p:spTree>
-      <p:nvGrpSpPr>
-        <p:cNvPr id="1" name=""/>
-        <p:cNvGrpSpPr/>
-        <p:nvPr/>
-      </p:nvGrpSpPr>
-      <p:grpSpPr>
-        <a:xfrm>
-          <a:off x="0" y="0"/>
-          <a:ext cx="0" cy="0"/>
-          <a:chOff x="0" y="0"/>
-          <a:chExt cx="0" cy="0"/>
-        </a:xfrm>
-      </p:grpSpPr>
-      <p:sp>
-        <p:nvSpPr>
-          <p:cNvPr id="2" name="Title 1"/>
-          <p:cNvSpPr>
-            <a:spLocks noGrp="1"/>
-          </p:cNvSpPr>
-          <p:nvPr>
-            <p:ph type="title"/>
-          </p:nvPr>
-        </p:nvSpPr>
-        <p:spPr/>
-        <p:txBody>
-          <a:bodyPr/>
-          <a:lstStyle/>
-          <a:p>
-            <a:r>
-              <a:rPr lang="en-US" dirty="0" smtClean="0"/>
-              <a:t>MD Packages that Exist</a:t>
-            </a:r>
-            <a:endParaRPr lang="en-US" dirty="0"/>
-          </a:p>
-        </p:txBody>
-      </p:sp>
-      <p:sp>
-        <p:nvSpPr>
-          <p:cNvPr id="3" name="Content Placeholder 2"/>
-          <p:cNvSpPr>
-            <a:spLocks noGrp="1"/>
-          </p:cNvSpPr>
-          <p:nvPr>
-            <p:ph idx="1"/>
-          </p:nvPr>
-        </p:nvSpPr>
-        <p:spPr/>
-        <p:txBody>
-          <a:bodyPr/>
-          <a:lstStyle/>
-          <a:p>
-            <a:r>
-              <a:rPr lang="en-US" dirty="0" smtClean="0"/>
-              <a:t>HOOMD</a:t>
-            </a:r>
-          </a:p>
-          <a:p>
-            <a:r>
-              <a:rPr lang="en-US" dirty="0" smtClean="0"/>
-              <a:t>LAMMPS</a:t>
-            </a:r>
-          </a:p>
-          <a:p>
-            <a:r>
-              <a:rPr lang="en-US" dirty="0" smtClean="0"/>
-              <a:t>GROMACS</a:t>
-            </a:r>
-          </a:p>
-          <a:p>
-            <a:r>
-              <a:rPr lang="en-US" dirty="0" smtClean="0"/>
-              <a:t>NAMD</a:t>
-            </a:r>
-          </a:p>
-          <a:p>
-            <a:r>
-              <a:rPr lang="en-US" dirty="0" smtClean="0"/>
-              <a:t>CHARMM</a:t>
-            </a:r>
-          </a:p>
-          <a:p>
-            <a:r>
-              <a:rPr lang="en-US" dirty="0" smtClean="0"/>
-              <a:t>AMBER</a:t>
-            </a:r>
-            <a:endParaRPr lang="en-US" dirty="0"/>
-          </a:p>
-        </p:txBody>
-      </p:sp>
-    </p:spTree>
-    <p:extLst>
-      <p:ext uri="{BB962C8B-B14F-4D97-AF65-F5344CB8AC3E}">
-        <p14:creationId xmlns:p14="http://schemas.microsoft.com/office/powerpoint/2010/main" val="628423803"/>
-      </p:ext>
-    </p:extLst>
-  </p:cSld>
-  <p:clrMapOvr>
-    <a:masterClrMapping/>
-  </p:clrMapOvr>
-</p:sld>
-</file>
-
-<file path=ppt/slides/slide7.xml><?xml version="1.0" encoding="utf-8"?>
-<p:sld xmlns:a="http://schemas.openxmlformats.org/drawingml/2006/main" xmlns:r="http://schemas.openxmlformats.org/officeDocument/2006/relationships" xmlns:p="http://schemas.openxmlformats.org/presentationml/2006/main">
-  <p:cSld>
-    <p:spTree>
-      <p:nvGrpSpPr>
-        <p:cNvPr id="1" name=""/>
-        <p:cNvGrpSpPr/>
-        <p:nvPr/>
-      </p:nvGrpSpPr>
-      <p:grpSpPr>
-        <a:xfrm>
-          <a:off x="0" y="0"/>
-          <a:ext cx="0" cy="0"/>
-          <a:chOff x="0" y="0"/>
-          <a:chExt cx="0" cy="0"/>
-        </a:xfrm>
-      </p:grpSpPr>
-      <p:sp>
-        <p:nvSpPr>
-          <p:cNvPr id="2" name="Title 1"/>
-          <p:cNvSpPr>
-            <a:spLocks noGrp="1"/>
-          </p:cNvSpPr>
-          <p:nvPr>
-            <p:ph type="title"/>
-          </p:nvPr>
-        </p:nvSpPr>
-        <p:spPr/>
-        <p:txBody>
-          <a:bodyPr/>
-          <a:lstStyle/>
-          <a:p>
-            <a:r>
-              <a:rPr lang="en-US" dirty="0" smtClean="0"/>
-              <a:t>CBEMD Architectural Decisions</a:t>
-            </a:r>
-            <a:endParaRPr lang="en-US" dirty="0"/>
-          </a:p>
-        </p:txBody>
-      </p:sp>
-      <p:sp>
-        <p:nvSpPr>
-          <p:cNvPr id="3" name="Content Placeholder 2"/>
-          <p:cNvSpPr>
-            <a:spLocks noGrp="1"/>
-          </p:cNvSpPr>
-          <p:nvPr>
-            <p:ph idx="1"/>
-          </p:nvPr>
-        </p:nvSpPr>
-        <p:spPr/>
-        <p:txBody>
-          <a:bodyPr>
-            <a:normAutofit fontScale="92500" lnSpcReduction="10000"/>
-          </a:bodyPr>
-          <a:lstStyle/>
-          <a:p>
-            <a:r>
-              <a:rPr lang="en-US" dirty="0" smtClean="0"/>
-              <a:t>C++</a:t>
-            </a:r>
-          </a:p>
-          <a:p>
-            <a:pPr lvl="1"/>
-            <a:r>
-              <a:rPr lang="en-US" dirty="0" smtClean="0"/>
-              <a:t>Majority of code exploiting OOP, MPI parallelization,</a:t>
-            </a:r>
-          </a:p>
-          <a:p>
-            <a:pPr lvl="1"/>
-            <a:r>
-              <a:rPr lang="en-US" dirty="0"/>
-              <a:t>L</a:t>
-            </a:r>
-            <a:r>
-              <a:rPr lang="en-US" dirty="0" smtClean="0"/>
-              <a:t>inked to boost to handle string manipulation features for data parsing</a:t>
-            </a:r>
-          </a:p>
-          <a:p>
-            <a:pPr lvl="1"/>
-            <a:r>
-              <a:rPr lang="en-US" dirty="0" err="1" smtClean="0"/>
-              <a:t>Googletests</a:t>
-            </a:r>
-            <a:r>
-              <a:rPr lang="en-US" dirty="0" smtClean="0"/>
-              <a:t> for testing main programs</a:t>
-            </a:r>
-          </a:p>
-          <a:p>
-            <a:pPr lvl="1"/>
-            <a:r>
-              <a:rPr lang="en-US" dirty="0" smtClean="0"/>
-              <a:t>Driver program </a:t>
-            </a:r>
-          </a:p>
-          <a:p>
-            <a:r>
-              <a:rPr lang="en-US" dirty="0" smtClean="0"/>
-              <a:t>Python</a:t>
-            </a:r>
-          </a:p>
-          <a:p>
-            <a:pPr lvl="1"/>
-            <a:r>
-              <a:rPr lang="en-US" dirty="0" smtClean="0"/>
-              <a:t> “User-friendly” interface to setup and run simulations</a:t>
-            </a:r>
-          </a:p>
-          <a:p>
-            <a:pPr lvl="1"/>
-            <a:r>
-              <a:rPr lang="en-US" dirty="0" smtClean="0"/>
-              <a:t>SWIG to call C++ functions from Python</a:t>
-            </a:r>
-          </a:p>
-          <a:p>
-            <a:pPr lvl="1"/>
-            <a:r>
-              <a:rPr lang="en-US" dirty="0" smtClean="0"/>
-              <a:t>Python </a:t>
-            </a:r>
-            <a:r>
-              <a:rPr lang="en-US" dirty="0" err="1" smtClean="0"/>
-              <a:t>unittests</a:t>
-            </a:r>
-            <a:r>
-              <a:rPr lang="en-US" dirty="0" smtClean="0"/>
-              <a:t> to test interface</a:t>
-            </a:r>
-            <a:endParaRPr lang="en-US" dirty="0"/>
-          </a:p>
-        </p:txBody>
-      </p:sp>
-    </p:spTree>
-    <p:extLst>
-      <p:ext uri="{BB962C8B-B14F-4D97-AF65-F5344CB8AC3E}">
-        <p14:creationId xmlns:p14="http://schemas.microsoft.com/office/powerpoint/2010/main" val="2277527461"/>
-      </p:ext>
-    </p:extLst>
-  </p:cSld>
-  <p:clrMapOvr>
-    <a:masterClrMapping/>
-  </p:clrMapOvr>
-</p:sld>
-</file>
-
-<file path=ppt/slides/slide8.xml><?xml version="1.0" encoding="utf-8"?>
 <p:sld xmlns:a="http://schemas.openxmlformats.org/drawingml/2006/main" xmlns:r="http://schemas.openxmlformats.org/officeDocument/2006/relationships" xmlns:p="http://schemas.openxmlformats.org/presentationml/2006/main">
   <p:cSld>
     <p:spTree>
@@ -6599,14 +5246,14 @@
           </a:ln>
           <a:effectLst/>
           <a:extLst>
-            <a:ext uri="{909E8E84-426E-40DD-AFC4-6F175D3DCCD1}">
+            <a:ext uri="{909E8E84-426E-40dd-AFC4-6F175D3DCCD1}">
               <a14:hiddenFill xmlns:a14="http://schemas.microsoft.com/office/drawing/2010/main">
                 <a:solidFill>
                   <a:schemeClr val="accent1"/>
                 </a:solidFill>
               </a14:hiddenFill>
             </a:ext>
-            <a:ext uri="{91240B29-F687-4F45-9708-019B960494DF}">
+            <a:ext uri="{91240B29-F687-4f45-9708-019B960494DF}">
               <a14:hiddenLine xmlns:a14="http://schemas.microsoft.com/office/drawing/2010/main" w="9525">
                 <a:solidFill>
                   <a:schemeClr val="tx1"/>
@@ -6616,7 +5263,7 @@
                 <a:tailEnd/>
               </a14:hiddenLine>
             </a:ext>
-            <a:ext uri="{AF507438-7753-43E0-B8FC-AC1667EBCBE1}">
+            <a:ext uri="{AF507438-7753-43e0-B8FC-AC1667EBCBE1}">
               <a14:hiddenEffects xmlns:a14="http://schemas.microsoft.com/office/drawing/2010/main">
                 <a:effectLst>
                   <a:outerShdw dist="35921" dir="2700000" algn="ctr" rotWithShape="0">
@@ -6659,7 +5306,724 @@
     </p:spTree>
     <p:extLst>
       <p:ext uri="{BB962C8B-B14F-4D97-AF65-F5344CB8AC3E}">
-        <p14:creationId xmlns:p14="http://schemas.microsoft.com/office/powerpoint/2010/main" val="951918039"/>
+        <p14:creationId xmlns:p14="http://schemas.microsoft.com/office/powerpoint/2010/main" val="2722971370"/>
+      </p:ext>
+    </p:extLst>
+  </p:cSld>
+  <p:clrMapOvr>
+    <a:masterClrMapping/>
+  </p:clrMapOvr>
+</p:sld>
+</file>
+
+<file path=ppt/slides/slide4.xml><?xml version="1.0" encoding="utf-8"?>
+<p:sld xmlns:a="http://schemas.openxmlformats.org/drawingml/2006/main" xmlns:r="http://schemas.openxmlformats.org/officeDocument/2006/relationships" xmlns:p="http://schemas.openxmlformats.org/presentationml/2006/main">
+  <p:cSld>
+    <p:spTree>
+      <p:nvGrpSpPr>
+        <p:cNvPr id="1" name=""/>
+        <p:cNvGrpSpPr/>
+        <p:nvPr/>
+      </p:nvGrpSpPr>
+      <p:grpSpPr>
+        <a:xfrm>
+          <a:off x="0" y="0"/>
+          <a:ext cx="0" cy="0"/>
+          <a:chOff x="0" y="0"/>
+          <a:chExt cx="0" cy="0"/>
+        </a:xfrm>
+      </p:grpSpPr>
+      <p:sp>
+        <p:nvSpPr>
+          <p:cNvPr id="2" name="Title 1"/>
+          <p:cNvSpPr>
+            <a:spLocks noGrp="1"/>
+          </p:cNvSpPr>
+          <p:nvPr>
+            <p:ph type="title"/>
+          </p:nvPr>
+        </p:nvSpPr>
+        <p:spPr/>
+        <p:txBody>
+          <a:bodyPr/>
+          <a:lstStyle/>
+          <a:p>
+            <a:r>
+              <a:rPr lang="en-US" dirty="0" smtClean="0"/>
+              <a:t>Ensembles in MD</a:t>
+            </a:r>
+            <a:endParaRPr lang="en-US" dirty="0"/>
+          </a:p>
+        </p:txBody>
+      </p:sp>
+      <p:sp>
+        <p:nvSpPr>
+          <p:cNvPr id="3" name="Content Placeholder 2"/>
+          <p:cNvSpPr>
+            <a:spLocks noGrp="1"/>
+          </p:cNvSpPr>
+          <p:nvPr>
+            <p:ph idx="1"/>
+          </p:nvPr>
+        </p:nvSpPr>
+        <p:spPr/>
+        <p:txBody>
+          <a:bodyPr/>
+          <a:lstStyle/>
+          <a:p>
+            <a:r>
+              <a:rPr lang="en-US" dirty="0" smtClean="0"/>
+              <a:t>NVE: (</a:t>
+            </a:r>
+            <a:r>
+              <a:rPr lang="en-US" dirty="0" err="1" smtClean="0"/>
+              <a:t>Microcanonical</a:t>
+            </a:r>
+            <a:r>
+              <a:rPr lang="en-US" dirty="0" smtClean="0"/>
+              <a:t>) Constant Energy (E), Volume (V), and number of particles (N)</a:t>
+            </a:r>
+          </a:p>
+          <a:p>
+            <a:r>
+              <a:rPr lang="en-US" dirty="0" smtClean="0"/>
+              <a:t>NVT (Canonical) </a:t>
+            </a:r>
+          </a:p>
+          <a:p>
+            <a:pPr lvl="1"/>
+            <a:r>
+              <a:rPr lang="en-US" dirty="0" smtClean="0"/>
+              <a:t>Constant Temperature (T)</a:t>
+            </a:r>
+          </a:p>
+          <a:p>
+            <a:r>
+              <a:rPr lang="en-US" dirty="0" smtClean="0"/>
+              <a:t>NPT (isothermal-isobaric) </a:t>
+            </a:r>
+          </a:p>
+          <a:p>
+            <a:pPr lvl="1"/>
+            <a:r>
+              <a:rPr lang="en-US" dirty="0" smtClean="0"/>
+              <a:t>Constant Pressure (P)</a:t>
+            </a:r>
+          </a:p>
+          <a:p>
+            <a:pPr lvl="1"/>
+            <a:r>
+              <a:rPr lang="en-US" dirty="0" smtClean="0"/>
+              <a:t>Most similar to experimental conditions</a:t>
+            </a:r>
+            <a:endParaRPr lang="en-US" dirty="0"/>
+          </a:p>
+        </p:txBody>
+      </p:sp>
+    </p:spTree>
+    <p:extLst>
+      <p:ext uri="{BB962C8B-B14F-4D97-AF65-F5344CB8AC3E}">
+        <p14:creationId xmlns:p14="http://schemas.microsoft.com/office/powerpoint/2010/main" val="446223969"/>
+      </p:ext>
+    </p:extLst>
+  </p:cSld>
+  <p:clrMapOvr>
+    <a:masterClrMapping/>
+  </p:clrMapOvr>
+</p:sld>
+</file>
+
+<file path=ppt/slides/slide5.xml><?xml version="1.0" encoding="utf-8"?>
+<p:sld xmlns:a="http://schemas.openxmlformats.org/drawingml/2006/main" xmlns:r="http://schemas.openxmlformats.org/officeDocument/2006/relationships" xmlns:p="http://schemas.openxmlformats.org/presentationml/2006/main">
+  <p:cSld>
+    <p:spTree>
+      <p:nvGrpSpPr>
+        <p:cNvPr id="1" name=""/>
+        <p:cNvGrpSpPr/>
+        <p:nvPr/>
+      </p:nvGrpSpPr>
+      <p:grpSpPr>
+        <a:xfrm>
+          <a:off x="0" y="0"/>
+          <a:ext cx="0" cy="0"/>
+          <a:chOff x="0" y="0"/>
+          <a:chExt cx="0" cy="0"/>
+        </a:xfrm>
+      </p:grpSpPr>
+      <p:sp>
+        <p:nvSpPr>
+          <p:cNvPr id="2" name="Title 1"/>
+          <p:cNvSpPr>
+            <a:spLocks noGrp="1"/>
+          </p:cNvSpPr>
+          <p:nvPr>
+            <p:ph type="title"/>
+          </p:nvPr>
+        </p:nvSpPr>
+        <p:spPr/>
+        <p:txBody>
+          <a:bodyPr/>
+          <a:lstStyle/>
+          <a:p>
+            <a:r>
+              <a:rPr lang="en-US" dirty="0" smtClean="0"/>
+              <a:t>MD Packages that Exist</a:t>
+            </a:r>
+            <a:endParaRPr lang="en-US" dirty="0"/>
+          </a:p>
+        </p:txBody>
+      </p:sp>
+      <p:sp>
+        <p:nvSpPr>
+          <p:cNvPr id="3" name="Content Placeholder 2"/>
+          <p:cNvSpPr>
+            <a:spLocks noGrp="1"/>
+          </p:cNvSpPr>
+          <p:nvPr>
+            <p:ph idx="1"/>
+          </p:nvPr>
+        </p:nvSpPr>
+        <p:spPr/>
+        <p:txBody>
+          <a:bodyPr/>
+          <a:lstStyle/>
+          <a:p>
+            <a:r>
+              <a:rPr lang="en-US" dirty="0" smtClean="0"/>
+              <a:t>HOOMD</a:t>
+            </a:r>
+          </a:p>
+          <a:p>
+            <a:r>
+              <a:rPr lang="en-US" dirty="0" smtClean="0"/>
+              <a:t>LAMMPS</a:t>
+            </a:r>
+          </a:p>
+          <a:p>
+            <a:r>
+              <a:rPr lang="en-US" dirty="0" smtClean="0"/>
+              <a:t>GROMACS</a:t>
+            </a:r>
+          </a:p>
+          <a:p>
+            <a:r>
+              <a:rPr lang="en-US" dirty="0" smtClean="0"/>
+              <a:t>NAMD</a:t>
+            </a:r>
+          </a:p>
+          <a:p>
+            <a:r>
+              <a:rPr lang="en-US" dirty="0" smtClean="0"/>
+              <a:t>CHARMM</a:t>
+            </a:r>
+          </a:p>
+          <a:p>
+            <a:r>
+              <a:rPr lang="en-US" dirty="0" smtClean="0"/>
+              <a:t>AMBER</a:t>
+            </a:r>
+            <a:endParaRPr lang="en-US" dirty="0"/>
+          </a:p>
+        </p:txBody>
+      </p:sp>
+    </p:spTree>
+    <p:extLst>
+      <p:ext uri="{BB962C8B-B14F-4D97-AF65-F5344CB8AC3E}">
+        <p14:creationId xmlns:p14="http://schemas.microsoft.com/office/powerpoint/2010/main" val="628423803"/>
+      </p:ext>
+    </p:extLst>
+  </p:cSld>
+  <p:clrMapOvr>
+    <a:masterClrMapping/>
+  </p:clrMapOvr>
+</p:sld>
+</file>
+
+<file path=ppt/slides/slide6.xml><?xml version="1.0" encoding="utf-8"?>
+<p:sld xmlns:a="http://schemas.openxmlformats.org/drawingml/2006/main" xmlns:r="http://schemas.openxmlformats.org/officeDocument/2006/relationships" xmlns:p="http://schemas.openxmlformats.org/presentationml/2006/main">
+  <p:cSld>
+    <p:spTree>
+      <p:nvGrpSpPr>
+        <p:cNvPr id="1" name=""/>
+        <p:cNvGrpSpPr/>
+        <p:nvPr/>
+      </p:nvGrpSpPr>
+      <p:grpSpPr>
+        <a:xfrm>
+          <a:off x="0" y="0"/>
+          <a:ext cx="0" cy="0"/>
+          <a:chOff x="0" y="0"/>
+          <a:chExt cx="0" cy="0"/>
+        </a:xfrm>
+      </p:grpSpPr>
+      <p:sp>
+        <p:nvSpPr>
+          <p:cNvPr id="2" name="Title 1"/>
+          <p:cNvSpPr>
+            <a:spLocks noGrp="1"/>
+          </p:cNvSpPr>
+          <p:nvPr>
+            <p:ph type="title"/>
+          </p:nvPr>
+        </p:nvSpPr>
+        <p:spPr/>
+        <p:txBody>
+          <a:bodyPr/>
+          <a:lstStyle/>
+          <a:p>
+            <a:r>
+              <a:rPr lang="en-US" dirty="0" smtClean="0"/>
+              <a:t>CBEMD Architectural Decisions</a:t>
+            </a:r>
+            <a:endParaRPr lang="en-US" dirty="0"/>
+          </a:p>
+        </p:txBody>
+      </p:sp>
+      <p:sp>
+        <p:nvSpPr>
+          <p:cNvPr id="3" name="Content Placeholder 2"/>
+          <p:cNvSpPr>
+            <a:spLocks noGrp="1"/>
+          </p:cNvSpPr>
+          <p:nvPr>
+            <p:ph idx="1"/>
+          </p:nvPr>
+        </p:nvSpPr>
+        <p:spPr/>
+        <p:txBody>
+          <a:bodyPr>
+            <a:normAutofit fontScale="92500"/>
+          </a:bodyPr>
+          <a:lstStyle/>
+          <a:p>
+            <a:r>
+              <a:rPr lang="en-US" dirty="0" smtClean="0"/>
+              <a:t>C++</a:t>
+            </a:r>
+          </a:p>
+          <a:p>
+            <a:pPr lvl="1"/>
+            <a:r>
+              <a:rPr lang="en-US" dirty="0" smtClean="0"/>
+              <a:t>Majority of code exploiting OOP, MPI parallelization,</a:t>
+            </a:r>
+          </a:p>
+          <a:p>
+            <a:pPr lvl="1"/>
+            <a:r>
+              <a:rPr lang="en-US" dirty="0" smtClean="0"/>
+              <a:t>Convenient libraries like boost</a:t>
+            </a:r>
+            <a:endParaRPr lang="en-US" dirty="0" smtClean="0"/>
+          </a:p>
+          <a:p>
+            <a:pPr lvl="1"/>
+            <a:r>
+              <a:rPr lang="en-US" dirty="0" err="1" smtClean="0"/>
+              <a:t>Googletests</a:t>
+            </a:r>
+            <a:r>
+              <a:rPr lang="en-US" dirty="0" smtClean="0"/>
+              <a:t> for testing main programs</a:t>
+            </a:r>
+          </a:p>
+          <a:p>
+            <a:pPr lvl="1"/>
+            <a:r>
+              <a:rPr lang="en-US" dirty="0" smtClean="0"/>
+              <a:t>Driver program </a:t>
+            </a:r>
+          </a:p>
+          <a:p>
+            <a:r>
+              <a:rPr lang="en-US" dirty="0" smtClean="0"/>
+              <a:t>Python</a:t>
+            </a:r>
+          </a:p>
+          <a:p>
+            <a:pPr lvl="1"/>
+            <a:r>
+              <a:rPr lang="en-US" dirty="0" smtClean="0"/>
+              <a:t> “User-friendly” interface to setup and run simulations</a:t>
+            </a:r>
+          </a:p>
+          <a:p>
+            <a:pPr lvl="1"/>
+            <a:r>
+              <a:rPr lang="en-US" dirty="0" smtClean="0"/>
+              <a:t>SWIG to call C++ functions from Python</a:t>
+            </a:r>
+          </a:p>
+          <a:p>
+            <a:pPr lvl="1"/>
+            <a:r>
+              <a:rPr lang="en-US" dirty="0" smtClean="0"/>
+              <a:t>Python </a:t>
+            </a:r>
+            <a:r>
+              <a:rPr lang="en-US" dirty="0" err="1" smtClean="0"/>
+              <a:t>unittests</a:t>
+            </a:r>
+            <a:r>
+              <a:rPr lang="en-US" dirty="0" smtClean="0"/>
+              <a:t> to test interface</a:t>
+            </a:r>
+            <a:endParaRPr lang="en-US" dirty="0"/>
+          </a:p>
+        </p:txBody>
+      </p:sp>
+    </p:spTree>
+    <p:extLst>
+      <p:ext uri="{BB962C8B-B14F-4D97-AF65-F5344CB8AC3E}">
+        <p14:creationId xmlns:p14="http://schemas.microsoft.com/office/powerpoint/2010/main" val="2277527461"/>
+      </p:ext>
+    </p:extLst>
+  </p:cSld>
+  <p:clrMapOvr>
+    <a:masterClrMapping/>
+  </p:clrMapOvr>
+</p:sld>
+</file>
+
+<file path=ppt/slides/slide7.xml><?xml version="1.0" encoding="utf-8"?>
+<p:sld xmlns:a="http://schemas.openxmlformats.org/drawingml/2006/main" xmlns:r="http://schemas.openxmlformats.org/officeDocument/2006/relationships" xmlns:p="http://schemas.openxmlformats.org/presentationml/2006/main">
+  <p:cSld>
+    <p:spTree>
+      <p:nvGrpSpPr>
+        <p:cNvPr id="1" name=""/>
+        <p:cNvGrpSpPr/>
+        <p:nvPr/>
+      </p:nvGrpSpPr>
+      <p:grpSpPr>
+        <a:xfrm>
+          <a:off x="0" y="0"/>
+          <a:ext cx="0" cy="0"/>
+          <a:chOff x="0" y="0"/>
+          <a:chExt cx="0" cy="0"/>
+        </a:xfrm>
+      </p:grpSpPr>
+      <p:sp>
+        <p:nvSpPr>
+          <p:cNvPr id="2" name="Title 1"/>
+          <p:cNvSpPr>
+            <a:spLocks noGrp="1"/>
+          </p:cNvSpPr>
+          <p:nvPr>
+            <p:ph type="title"/>
+          </p:nvPr>
+        </p:nvSpPr>
+        <p:spPr/>
+        <p:txBody>
+          <a:bodyPr>
+            <a:normAutofit fontScale="90000"/>
+          </a:bodyPr>
+          <a:lstStyle/>
+          <a:p>
+            <a:r>
+              <a:rPr lang="en-US" dirty="0" smtClean="0"/>
+              <a:t>An Efficient Interface to </a:t>
+            </a:r>
+            <a:br>
+              <a:rPr lang="en-US" dirty="0" smtClean="0"/>
+            </a:br>
+            <a:r>
+              <a:rPr lang="en-US" dirty="0" smtClean="0"/>
+              <a:t>Facilitate </a:t>
+            </a:r>
+            <a:r>
+              <a:rPr lang="en-US" dirty="0" err="1" smtClean="0"/>
+              <a:t>Groupwork</a:t>
+            </a:r>
+            <a:endParaRPr lang="en-US" dirty="0"/>
+          </a:p>
+        </p:txBody>
+      </p:sp>
+      <p:sp>
+        <p:nvSpPr>
+          <p:cNvPr id="3" name="Content Placeholder 2"/>
+          <p:cNvSpPr>
+            <a:spLocks noGrp="1"/>
+          </p:cNvSpPr>
+          <p:nvPr>
+            <p:ph idx="1"/>
+          </p:nvPr>
+        </p:nvSpPr>
+        <p:spPr/>
+        <p:txBody>
+          <a:bodyPr>
+            <a:normAutofit/>
+          </a:bodyPr>
+          <a:lstStyle/>
+          <a:p>
+            <a:r>
+              <a:rPr lang="en-US" dirty="0" smtClean="0"/>
+              <a:t>System</a:t>
+            </a:r>
+          </a:p>
+          <a:p>
+            <a:pPr lvl="1"/>
+            <a:r>
+              <a:rPr lang="en-US" dirty="0" smtClean="0"/>
+              <a:t>Class </a:t>
+            </a:r>
+            <a:r>
+              <a:rPr lang="en-US" dirty="0"/>
+              <a:t>will contain all pertinent information about the simulation box such as temperature, </a:t>
+            </a:r>
+            <a:r>
+              <a:rPr lang="en-US" dirty="0" smtClean="0"/>
+              <a:t>pressure and </a:t>
+            </a:r>
+            <a:r>
+              <a:rPr lang="en-US" dirty="0"/>
+              <a:t>box </a:t>
+            </a:r>
+            <a:r>
+              <a:rPr lang="en-US" dirty="0" smtClean="0"/>
+              <a:t>dimensions</a:t>
+            </a:r>
+          </a:p>
+          <a:p>
+            <a:pPr lvl="1"/>
+            <a:r>
+              <a:rPr lang="en-US" dirty="0"/>
+              <a:t>C</a:t>
+            </a:r>
+            <a:r>
+              <a:rPr lang="en-US" dirty="0" smtClean="0"/>
+              <a:t>lass </a:t>
+            </a:r>
+            <a:r>
+              <a:rPr lang="en-US" dirty="0"/>
+              <a:t>will also store information about atoms and </a:t>
+            </a:r>
+            <a:r>
+              <a:rPr lang="en-US" dirty="0" smtClean="0"/>
+              <a:t>bonds</a:t>
+            </a:r>
+          </a:p>
+          <a:p>
+            <a:pPr lvl="1"/>
+            <a:r>
+              <a:rPr lang="en-US" dirty="0" smtClean="0"/>
+              <a:t>When </a:t>
+            </a:r>
+            <a:r>
+              <a:rPr lang="en-US" dirty="0"/>
+              <a:t>using </a:t>
+            </a:r>
+            <a:r>
+              <a:rPr lang="en-US" dirty="0" smtClean="0"/>
+              <a:t>MPI, the </a:t>
+            </a:r>
+            <a:r>
+              <a:rPr lang="en-US" dirty="0"/>
+              <a:t>simulation box will be decomposed into “subsystems,” each of which exists on a unique </a:t>
+            </a:r>
+            <a:r>
+              <a:rPr lang="en-US" dirty="0" smtClean="0"/>
+              <a:t>processor</a:t>
+            </a:r>
+            <a:endParaRPr lang="en-US" dirty="0"/>
+          </a:p>
+        </p:txBody>
+      </p:sp>
+    </p:spTree>
+    <p:extLst>
+      <p:ext uri="{BB962C8B-B14F-4D97-AF65-F5344CB8AC3E}">
+        <p14:creationId xmlns:p14="http://schemas.microsoft.com/office/powerpoint/2010/main" val="2705301629"/>
+      </p:ext>
+    </p:extLst>
+  </p:cSld>
+  <p:clrMapOvr>
+    <a:masterClrMapping/>
+  </p:clrMapOvr>
+</p:sld>
+</file>
+
+<file path=ppt/slides/slide8.xml><?xml version="1.0" encoding="utf-8"?>
+<p:sld xmlns:a="http://schemas.openxmlformats.org/drawingml/2006/main" xmlns:r="http://schemas.openxmlformats.org/officeDocument/2006/relationships" xmlns:p="http://schemas.openxmlformats.org/presentationml/2006/main">
+  <p:cSld>
+    <p:spTree>
+      <p:nvGrpSpPr>
+        <p:cNvPr id="1" name=""/>
+        <p:cNvGrpSpPr/>
+        <p:nvPr/>
+      </p:nvGrpSpPr>
+      <p:grpSpPr>
+        <a:xfrm>
+          <a:off x="0" y="0"/>
+          <a:ext cx="0" cy="0"/>
+          <a:chOff x="0" y="0"/>
+          <a:chExt cx="0" cy="0"/>
+        </a:xfrm>
+      </p:grpSpPr>
+      <p:sp>
+        <p:nvSpPr>
+          <p:cNvPr id="2" name="Title 1"/>
+          <p:cNvSpPr>
+            <a:spLocks noGrp="1"/>
+          </p:cNvSpPr>
+          <p:nvPr>
+            <p:ph type="title"/>
+          </p:nvPr>
+        </p:nvSpPr>
+        <p:spPr/>
+        <p:txBody>
+          <a:bodyPr>
+            <a:normAutofit fontScale="90000"/>
+          </a:bodyPr>
+          <a:lstStyle/>
+          <a:p>
+            <a:r>
+              <a:rPr lang="en-US" dirty="0" smtClean="0"/>
+              <a:t>An Efficient Interface to </a:t>
+            </a:r>
+            <a:br>
+              <a:rPr lang="en-US" dirty="0" smtClean="0"/>
+            </a:br>
+            <a:r>
+              <a:rPr lang="en-US" dirty="0" smtClean="0"/>
+              <a:t>Facilitate </a:t>
+            </a:r>
+            <a:r>
+              <a:rPr lang="en-US" dirty="0" err="1" smtClean="0"/>
+              <a:t>Groupwork</a:t>
+            </a:r>
+            <a:endParaRPr lang="en-US" dirty="0"/>
+          </a:p>
+        </p:txBody>
+      </p:sp>
+      <p:sp>
+        <p:nvSpPr>
+          <p:cNvPr id="3" name="Content Placeholder 2"/>
+          <p:cNvSpPr>
+            <a:spLocks noGrp="1"/>
+          </p:cNvSpPr>
+          <p:nvPr>
+            <p:ph idx="1"/>
+          </p:nvPr>
+        </p:nvSpPr>
+        <p:spPr/>
+        <p:txBody>
+          <a:bodyPr>
+            <a:normAutofit lnSpcReduction="10000"/>
+          </a:bodyPr>
+          <a:lstStyle/>
+          <a:p>
+            <a:r>
+              <a:rPr lang="en-US" dirty="0"/>
+              <a:t>Atom</a:t>
+            </a:r>
+            <a:endParaRPr lang="en-US" dirty="0" smtClean="0"/>
+          </a:p>
+          <a:p>
+            <a:pPr lvl="1"/>
+            <a:r>
+              <a:rPr lang="en-US" dirty="0"/>
+              <a:t>This will be a structure, i.e. no functions will be stored in this </a:t>
+            </a:r>
+            <a:r>
+              <a:rPr lang="en-US" dirty="0" smtClean="0"/>
+              <a:t>class</a:t>
+            </a:r>
+          </a:p>
+          <a:p>
+            <a:pPr lvl="2"/>
+            <a:r>
+              <a:rPr lang="en-US" dirty="0" smtClean="0"/>
+              <a:t>This </a:t>
+            </a:r>
+            <a:r>
+              <a:rPr lang="en-US" dirty="0"/>
+              <a:t>is the </a:t>
+            </a:r>
+            <a:r>
+              <a:rPr lang="en-US" dirty="0" smtClean="0"/>
+              <a:t>main “workhorse</a:t>
+            </a:r>
+            <a:r>
+              <a:rPr lang="en-US" dirty="0"/>
+              <a:t>” of the program </a:t>
+            </a:r>
+            <a:endParaRPr lang="en-US" dirty="0" smtClean="0"/>
+          </a:p>
+          <a:p>
+            <a:pPr lvl="2"/>
+            <a:r>
+              <a:rPr lang="en-US" dirty="0" smtClean="0"/>
+              <a:t>will </a:t>
+            </a:r>
+            <a:r>
+              <a:rPr lang="en-US" dirty="0"/>
+              <a:t>need to be passed repeatedly between processors to </a:t>
+            </a:r>
+            <a:r>
+              <a:rPr lang="en-US" dirty="0" smtClean="0"/>
+              <a:t>communicate requisite </a:t>
+            </a:r>
+            <a:r>
+              <a:rPr lang="en-US" dirty="0"/>
+              <a:t>information for the integration </a:t>
+            </a:r>
+            <a:r>
+              <a:rPr lang="en-US" dirty="0" smtClean="0"/>
+              <a:t>step</a:t>
+            </a:r>
+          </a:p>
+          <a:p>
+            <a:pPr lvl="1"/>
+            <a:r>
+              <a:rPr lang="en-US" dirty="0" smtClean="0"/>
+              <a:t>Will only </a:t>
+            </a:r>
+            <a:r>
+              <a:rPr lang="en-US" dirty="0"/>
+              <a:t>store critical </a:t>
+            </a:r>
+            <a:r>
+              <a:rPr lang="en-US" dirty="0" smtClean="0"/>
+              <a:t>information and </a:t>
+            </a:r>
+            <a:r>
+              <a:rPr lang="en-US" dirty="0"/>
+              <a:t>base data types easily passed through </a:t>
+            </a:r>
+            <a:r>
+              <a:rPr lang="en-US" dirty="0" smtClean="0"/>
+              <a:t>MPI</a:t>
+            </a:r>
+          </a:p>
+          <a:p>
+            <a:pPr lvl="2"/>
+            <a:r>
+              <a:rPr lang="en-US" dirty="0" smtClean="0"/>
+              <a:t>Positions</a:t>
+            </a:r>
+            <a:r>
+              <a:rPr lang="en-US" dirty="0"/>
+              <a:t>, </a:t>
+            </a:r>
+            <a:r>
+              <a:rPr lang="en-US" dirty="0" smtClean="0"/>
+              <a:t>velocities, and particle </a:t>
+            </a:r>
+            <a:r>
+              <a:rPr lang="en-US" dirty="0"/>
+              <a:t>types that are necessary for the force </a:t>
+            </a:r>
+            <a:r>
+              <a:rPr lang="en-US" dirty="0" smtClean="0"/>
+              <a:t>calculations</a:t>
+            </a:r>
+            <a:endParaRPr lang="en-US" dirty="0"/>
+          </a:p>
+        </p:txBody>
+      </p:sp>
+    </p:spTree>
+    <p:extLst>
+      <p:ext uri="{BB962C8B-B14F-4D97-AF65-F5344CB8AC3E}">
+        <p14:creationId xmlns:p14="http://schemas.microsoft.com/office/powerpoint/2010/main" val="2026033022"/>
       </p:ext>
     </p:extLst>
   </p:cSld>
@@ -6735,78 +6099,110 @@
         <p:spPr/>
         <p:txBody>
           <a:bodyPr>
-            <a:normAutofit/>
+            <a:normAutofit fontScale="77500" lnSpcReduction="20000"/>
           </a:bodyPr>
           <a:lstStyle/>
           <a:p>
             <a:r>
               <a:rPr lang="en-US" dirty="0" smtClean="0"/>
-              <a:t>System</a:t>
+              <a:t>Bond</a:t>
             </a:r>
           </a:p>
           <a:p>
             <a:pPr lvl="1"/>
             <a:r>
               <a:rPr lang="en-US" dirty="0" smtClean="0"/>
-              <a:t>Class </a:t>
+              <a:t>Largest </a:t>
             </a:r>
             <a:r>
               <a:rPr lang="en-US" dirty="0"/>
-              <a:t>will contain all pertinent information about the simulation box such as temperature, </a:t>
-            </a:r>
-            <a:r>
-              <a:rPr lang="en-US" dirty="0" smtClean="0"/>
-              <a:t>pressure and </a:t>
+              <a:t>complication in MD, because global indices must be tracked to </a:t>
+            </a:r>
+            <a:r>
+              <a:rPr lang="en-US" dirty="0" smtClean="0"/>
+              <a:t>manage what </a:t>
             </a:r>
             <a:r>
               <a:rPr lang="en-US" dirty="0"/>
-              <a:t>box </a:t>
-            </a:r>
-            <a:r>
-              <a:rPr lang="en-US" dirty="0" smtClean="0"/>
-              <a:t>dimensions</a:t>
+              <a:t>atoms are bonded to each other (since atoms participating in a bond may exist on </a:t>
+            </a:r>
+            <a:r>
+              <a:rPr lang="en-US" dirty="0" smtClean="0"/>
+              <a:t>diﬀerent processors) </a:t>
             </a:r>
           </a:p>
           <a:p>
             <a:pPr lvl="1"/>
             <a:r>
+              <a:rPr lang="en-US" dirty="0" smtClean="0"/>
+              <a:t>Abstract </a:t>
+            </a:r>
+            <a:r>
               <a:rPr lang="en-US" dirty="0"/>
-              <a:t>C</a:t>
-            </a:r>
-            <a:r>
-              <a:rPr lang="en-US" dirty="0" smtClean="0"/>
-              <a:t>lass </a:t>
+              <a:t>base class which allows users to deﬁne diﬀerent </a:t>
+            </a:r>
+            <a:r>
+              <a:rPr lang="en-US" dirty="0" smtClean="0"/>
+              <a:t>types easily</a:t>
             </a:r>
             <a:r>
               <a:rPr lang="en-US" dirty="0"/>
-              <a:t>will also store information about atoms and </a:t>
-            </a:r>
-            <a:r>
-              <a:rPr lang="en-US" dirty="0" smtClean="0"/>
-              <a:t>bonds</a:t>
+              <a:t>, requiring only that each deﬁned type have an energy and force </a:t>
+            </a:r>
+            <a:r>
+              <a:rPr lang="en-US" dirty="0" smtClean="0"/>
+              <a:t>calculation</a:t>
             </a:r>
           </a:p>
           <a:p>
             <a:pPr lvl="1"/>
             <a:r>
               <a:rPr lang="en-US" dirty="0" smtClean="0"/>
-              <a:t>When </a:t>
+              <a:t>Parameters involved in </a:t>
             </a:r>
             <a:r>
               <a:rPr lang="en-US" dirty="0"/>
-              <a:t>using </a:t>
-            </a:r>
-            <a:r>
-              <a:rPr lang="en-US" dirty="0" smtClean="0"/>
-              <a:t>MPI, the </a:t>
+              <a:t>a bond “type” will be set by the user and available on all processors at all times so such </a:t>
+            </a:r>
+            <a:r>
+              <a:rPr lang="en-US" dirty="0" smtClean="0"/>
+              <a:t>information need </a:t>
             </a:r>
             <a:r>
               <a:rPr lang="en-US" dirty="0"/>
-              <a:t>simulation box will be decomposed into “subsystems,” each of which exists on a unique </a:t>
-            </a:r>
-            <a:r>
-              <a:rPr lang="en-US" dirty="0" smtClean="0"/>
-              <a:t>processor</a:t>
+              <a:t>not be passed; the only information necessary to compute bonding contributions an array </a:t>
+            </a:r>
+            <a:r>
+              <a:rPr lang="en-US" dirty="0" smtClean="0"/>
+              <a:t>of bonded </a:t>
+            </a:r>
+            <a:r>
+              <a:rPr lang="en-US" dirty="0"/>
+              <a:t>pairs of atoms and their “type.” </a:t>
+            </a:r>
+            <a:endParaRPr lang="en-US" dirty="0" smtClean="0"/>
+          </a:p>
+          <a:p>
+            <a:pPr lvl="1"/>
+            <a:r>
+              <a:rPr lang="en-US" dirty="0" smtClean="0"/>
+              <a:t>The </a:t>
+            </a:r>
+            <a:r>
+              <a:rPr lang="en-US" dirty="0"/>
+              <a:t>bond type is an internally indexed quantity that </a:t>
+            </a:r>
+            <a:r>
+              <a:rPr lang="en-US" dirty="0" smtClean="0"/>
+              <a:t>is hidden </a:t>
+            </a:r>
+            <a:r>
+              <a:rPr lang="en-US" dirty="0"/>
+              <a:t>from the user, and is accessed by a name (string</a:t>
+            </a:r>
+            <a:r>
+              <a:rPr lang="en-US" dirty="0" smtClean="0"/>
+              <a:t>)</a:t>
             </a:r>
             <a:endParaRPr lang="en-US" dirty="0"/>
           </a:p>
@@ -6815,7 +6211,7 @@
     </p:spTree>
     <p:extLst>
       <p:ext uri="{BB962C8B-B14F-4D97-AF65-F5344CB8AC3E}">
-        <p14:creationId xmlns:p14="http://schemas.microsoft.com/office/powerpoint/2010/main" val="2705301629"/>
+        <p14:creationId xmlns:p14="http://schemas.microsoft.com/office/powerpoint/2010/main" val="3908138487"/>
       </p:ext>
     </p:extLst>
   </p:cSld>

</xml_diff>

<commit_message>
Made corrections per Arun's great comments.
</commit_message>
<xml_diff>
--- a/designreview/designreview.pptx
+++ b/designreview/designreview.pptx
@@ -206,7 +206,7 @@
           <a:p>
             <a:fld id="{732BBF93-3B08-4B83-8221-F119D0C4BF0B}" type="datetimeFigureOut">
               <a:rPr lang="en-US" smtClean="0"/>
-              <a:t>11/25/12</a:t>
+              <a:t>11/26/2012</a:t>
             </a:fld>
             <a:endParaRPr lang="en-US"/>
           </a:p>
@@ -1231,7 +1231,7 @@
           <a:p>
             <a:fld id="{5B0C209D-6D03-49A7-AE32-45A630EFA8C6}" type="datetimeFigureOut">
               <a:rPr lang="en-US" smtClean="0"/>
-              <a:t>11/25/12</a:t>
+              <a:t>11/26/2012</a:t>
             </a:fld>
             <a:endParaRPr lang="en-US"/>
           </a:p>
@@ -1401,7 +1401,7 @@
           <a:p>
             <a:fld id="{5B0C209D-6D03-49A7-AE32-45A630EFA8C6}" type="datetimeFigureOut">
               <a:rPr lang="en-US" smtClean="0"/>
-              <a:t>11/25/12</a:t>
+              <a:t>11/26/2012</a:t>
             </a:fld>
             <a:endParaRPr lang="en-US"/>
           </a:p>
@@ -1581,7 +1581,7 @@
           <a:p>
             <a:fld id="{5B0C209D-6D03-49A7-AE32-45A630EFA8C6}" type="datetimeFigureOut">
               <a:rPr lang="en-US" smtClean="0"/>
-              <a:t>11/25/12</a:t>
+              <a:t>11/26/2012</a:t>
             </a:fld>
             <a:endParaRPr lang="en-US"/>
           </a:p>
@@ -1751,7 +1751,7 @@
           <a:p>
             <a:fld id="{5B0C209D-6D03-49A7-AE32-45A630EFA8C6}" type="datetimeFigureOut">
               <a:rPr lang="en-US" smtClean="0"/>
-              <a:t>11/25/12</a:t>
+              <a:t>11/26/2012</a:t>
             </a:fld>
             <a:endParaRPr lang="en-US"/>
           </a:p>
@@ -1997,7 +1997,7 @@
           <a:p>
             <a:fld id="{5B0C209D-6D03-49A7-AE32-45A630EFA8C6}" type="datetimeFigureOut">
               <a:rPr lang="en-US" smtClean="0"/>
-              <a:t>11/25/12</a:t>
+              <a:t>11/26/2012</a:t>
             </a:fld>
             <a:endParaRPr lang="en-US"/>
           </a:p>
@@ -2285,7 +2285,7 @@
           <a:p>
             <a:fld id="{5B0C209D-6D03-49A7-AE32-45A630EFA8C6}" type="datetimeFigureOut">
               <a:rPr lang="en-US" smtClean="0"/>
-              <a:t>11/25/12</a:t>
+              <a:t>11/26/2012</a:t>
             </a:fld>
             <a:endParaRPr lang="en-US"/>
           </a:p>
@@ -2707,7 +2707,7 @@
           <a:p>
             <a:fld id="{5B0C209D-6D03-49A7-AE32-45A630EFA8C6}" type="datetimeFigureOut">
               <a:rPr lang="en-US" smtClean="0"/>
-              <a:t>11/25/12</a:t>
+              <a:t>11/26/2012</a:t>
             </a:fld>
             <a:endParaRPr lang="en-US"/>
           </a:p>
@@ -2825,7 +2825,7 @@
           <a:p>
             <a:fld id="{5B0C209D-6D03-49A7-AE32-45A630EFA8C6}" type="datetimeFigureOut">
               <a:rPr lang="en-US" smtClean="0"/>
-              <a:t>11/25/12</a:t>
+              <a:t>11/26/2012</a:t>
             </a:fld>
             <a:endParaRPr lang="en-US"/>
           </a:p>
@@ -2920,7 +2920,7 @@
           <a:p>
             <a:fld id="{5B0C209D-6D03-49A7-AE32-45A630EFA8C6}" type="datetimeFigureOut">
               <a:rPr lang="en-US" smtClean="0"/>
-              <a:t>11/25/12</a:t>
+              <a:t>11/26/2012</a:t>
             </a:fld>
             <a:endParaRPr lang="en-US"/>
           </a:p>
@@ -3197,7 +3197,7 @@
           <a:p>
             <a:fld id="{5B0C209D-6D03-49A7-AE32-45A630EFA8C6}" type="datetimeFigureOut">
               <a:rPr lang="en-US" smtClean="0"/>
-              <a:t>11/25/12</a:t>
+              <a:t>11/26/2012</a:t>
             </a:fld>
             <a:endParaRPr lang="en-US"/>
           </a:p>
@@ -3450,7 +3450,7 @@
           <a:p>
             <a:fld id="{5B0C209D-6D03-49A7-AE32-45A630EFA8C6}" type="datetimeFigureOut">
               <a:rPr lang="en-US" smtClean="0"/>
-              <a:t>11/25/12</a:t>
+              <a:t>11/26/2012</a:t>
             </a:fld>
             <a:endParaRPr lang="en-US"/>
           </a:p>
@@ -3663,7 +3663,7 @@
           <a:p>
             <a:fld id="{5B0C209D-6D03-49A7-AE32-45A630EFA8C6}" type="datetimeFigureOut">
               <a:rPr lang="en-US" smtClean="0"/>
-              <a:t>11/25/12</a:t>
+              <a:t>11/26/2012</a:t>
             </a:fld>
             <a:endParaRPr lang="en-US"/>
           </a:p>
@@ -4186,21 +4186,8 @@
                   <a:srgbClr val="FF0000"/>
                 </a:solidFill>
               </a:rPr>
-              <a:t> </a:t>
-            </a:r>
-            <a:r>
-              <a:rPr lang="en-US" dirty="0" smtClean="0">
-                <a:solidFill>
-                  <a:srgbClr val="FF0000"/>
-                </a:solidFill>
-              </a:rPr>
-              <a:t>Park</a:t>
-            </a:r>
-            <a:endParaRPr lang="en-US" dirty="0" smtClean="0">
-              <a:solidFill>
-                <a:srgbClr val="FF0000"/>
-              </a:solidFill>
-            </a:endParaRPr>
+              <a:t> Park</a:t>
+            </a:r>
           </a:p>
         </p:txBody>
       </p:sp>
@@ -4320,7 +4307,6 @@
               <a:rPr lang="en-US" dirty="0" smtClean="0"/>
               <a:t>NVE, NVT, NPT</a:t>
             </a:r>
-            <a:endParaRPr lang="en-US" dirty="0" smtClean="0"/>
           </a:p>
           <a:p>
             <a:pPr lvl="2"/>
@@ -4543,7 +4529,7 @@
           <a:graphicData uri="http://schemas.openxmlformats.org/presentationml/2006/ole">
             <mc:AlternateContent xmlns:mc="http://schemas.openxmlformats.org/markup-compatibility/2006">
               <mc:Choice xmlns:v="urn:schemas-microsoft-com:vml" Requires="v">
-                <p:oleObj spid="_x0000_s4122" name="Equation" r:id="rId4" imgW="1905000" imgH="520700" progId="Equation.3">
+                <p:oleObj spid="_x0000_s4123" name="Equation" r:id="rId4" imgW="1905000" imgH="520700" progId="Equation.3">
                   <p:embed/>
                 </p:oleObj>
               </mc:Choice>
@@ -4684,11 +4670,7 @@
             </a:r>
             <a:r>
               <a:rPr lang="en-US" dirty="0" smtClean="0"/>
-              <a:t>other </a:t>
-            </a:r>
-            <a:r>
-              <a:rPr lang="en-US" dirty="0" smtClean="0"/>
-              <a:t>programs</a:t>
+              <a:t>other programs</a:t>
             </a:r>
             <a:endParaRPr lang="en-US" dirty="0"/>
           </a:p>
@@ -4794,7 +4776,6 @@
               <a:rPr lang="en-US" dirty="0" smtClean="0"/>
               <a:t> questionnaire</a:t>
             </a:r>
-            <a:endParaRPr lang="en-US" dirty="0" smtClean="0"/>
           </a:p>
           <a:p>
             <a:r>
@@ -4805,11 +4786,7 @@
           <a:p>
             <a:r>
               <a:rPr lang="en-US" dirty="0" smtClean="0"/>
-              <a:t>Arbitrary bonds (</a:t>
-            </a:r>
-            <a:r>
-              <a:rPr lang="en-US" dirty="0" smtClean="0"/>
-              <a:t>as </a:t>
+              <a:t>Arbitrary bonds (as </a:t>
             </a:r>
             <a:r>
               <a:rPr lang="en-US" dirty="0"/>
@@ -4817,11 +4794,7 @@
             </a:r>
             <a:r>
               <a:rPr lang="en-US" dirty="0" smtClean="0"/>
-              <a:t>the </a:t>
-            </a:r>
-            <a:r>
-              <a:rPr lang="en-US" dirty="0" smtClean="0"/>
-              <a:t>abstract </a:t>
+              <a:t>the abstract </a:t>
             </a:r>
             <a:r>
               <a:rPr lang="en-US" dirty="0"/>
@@ -4839,16 +4812,20 @@
               <a:t>Extensible </a:t>
             </a:r>
             <a:r>
-              <a:rPr lang="en-US" dirty="0" smtClean="0"/>
+              <a:rPr lang="en-US" smtClean="0"/>
               <a:t>to </a:t>
             </a:r>
             <a:r>
-              <a:rPr lang="en-US" dirty="0"/>
-              <a:t>arbitrarily </a:t>
-            </a:r>
-            <a:r>
-              <a:rPr lang="en-US" dirty="0" smtClean="0"/>
-              <a:t>complex molecules</a:t>
+              <a:rPr lang="en-US" smtClean="0"/>
+              <a:t>more </a:t>
+            </a:r>
+            <a:r>
+              <a:rPr lang="en-US" smtClean="0"/>
+              <a:t>complex </a:t>
+            </a:r>
+            <a:r>
+              <a:rPr lang="en-US" dirty="0" smtClean="0"/>
+              <a:t>molecules</a:t>
             </a:r>
             <a:endParaRPr lang="en-US" dirty="0"/>
           </a:p>
@@ -4930,11 +4907,7 @@
             </a:r>
             <a:r>
               <a:rPr lang="en-US" dirty="0" smtClean="0"/>
-              <a:t>for arbitrary </a:t>
-            </a:r>
-            <a:r>
-              <a:rPr lang="en-US" dirty="0" smtClean="0"/>
-              <a:t>length </a:t>
+              <a:t>for arbitrary length </a:t>
             </a:r>
             <a:r>
               <a:rPr lang="en-US" dirty="0"/>
@@ -4942,11 +4915,7 @@
             </a:r>
             <a:r>
               <a:rPr lang="en-US" dirty="0" smtClean="0"/>
-              <a:t>number of processors</a:t>
-            </a:r>
-            <a:r>
-              <a:rPr lang="en-US" dirty="0" smtClean="0"/>
-              <a:t>.</a:t>
+              <a:t>number of processors.</a:t>
             </a:r>
           </a:p>
           <a:p>
@@ -4970,7 +4939,6 @@
               <a:rPr lang="en-US" dirty="0" smtClean="0"/>
               <a:t>exist</a:t>
             </a:r>
-            <a:endParaRPr lang="en-US" dirty="0" smtClean="0"/>
           </a:p>
           <a:p>
             <a:r>
@@ -5158,13 +5126,8 @@
             <a:pPr lvl="1"/>
             <a:r>
               <a:rPr lang="en-US" dirty="0" smtClean="0"/>
-              <a:t>Evaluate properties that would be difficult to do </a:t>
-            </a:r>
-            <a:r>
-              <a:rPr lang="en-US" dirty="0" smtClean="0"/>
-              <a:t>experimentally</a:t>
-            </a:r>
-            <a:endParaRPr lang="en-US" dirty="0" smtClean="0"/>
+              <a:t>Evaluate properties that would be difficult to do experimentally</a:t>
+            </a:r>
           </a:p>
           <a:p>
             <a:r>
@@ -5246,14 +5209,14 @@
           </a:ln>
           <a:effectLst/>
           <a:extLst>
-            <a:ext uri="{909E8E84-426E-40dd-AFC4-6F175D3DCCD1}">
+            <a:ext uri="{909E8E84-426E-40DD-AFC4-6F175D3DCCD1}">
               <a14:hiddenFill xmlns:a14="http://schemas.microsoft.com/office/drawing/2010/main">
                 <a:solidFill>
                   <a:schemeClr val="accent1"/>
                 </a:solidFill>
               </a14:hiddenFill>
             </a:ext>
-            <a:ext uri="{91240B29-F687-4f45-9708-019B960494DF}">
+            <a:ext uri="{91240B29-F687-4F45-9708-019B960494DF}">
               <a14:hiddenLine xmlns:a14="http://schemas.microsoft.com/office/drawing/2010/main" w="9525">
                 <a:solidFill>
                   <a:schemeClr val="tx1"/>
@@ -5263,7 +5226,7 @@
                 <a:tailEnd/>
               </a14:hiddenLine>
             </a:ext>
-            <a:ext uri="{AF507438-7753-43e0-B8FC-AC1667EBCBE1}">
+            <a:ext uri="{AF507438-7753-43E0-B8FC-AC1667EBCBE1}">
               <a14:hiddenEffects xmlns:a14="http://schemas.microsoft.com/office/drawing/2010/main">
                 <a:effectLst>
                   <a:outerShdw dist="35921" dir="2700000" algn="ctr" rotWithShape="0">
@@ -5614,7 +5577,6 @@
               <a:rPr lang="en-US" dirty="0" smtClean="0"/>
               <a:t>Convenient libraries like boost</a:t>
             </a:r>
-            <a:endParaRPr lang="en-US" dirty="0" smtClean="0"/>
           </a:p>
           <a:p>
             <a:pPr lvl="1"/>
@@ -5907,7 +5869,7 @@
         <p:spPr/>
         <p:txBody>
           <a:bodyPr>
-            <a:normAutofit lnSpcReduction="10000"/>
+            <a:normAutofit/>
           </a:bodyPr>
           <a:lstStyle/>
           <a:p>
@@ -5932,27 +5894,7 @@
             <a:pPr lvl="2"/>
             <a:r>
               <a:rPr lang="en-US" dirty="0" smtClean="0"/>
-              <a:t>This </a:t>
-            </a:r>
-            <a:r>
-              <a:rPr lang="en-US" dirty="0"/>
-              <a:t>is the </a:t>
-            </a:r>
-            <a:r>
-              <a:rPr lang="en-US" dirty="0" smtClean="0"/>
-              <a:t>main “workhorse</a:t>
-            </a:r>
-            <a:r>
-              <a:rPr lang="en-US" dirty="0"/>
-              <a:t>” of the program </a:t>
-            </a:r>
-            <a:endParaRPr lang="en-US" dirty="0" smtClean="0"/>
-          </a:p>
-          <a:p>
-            <a:pPr lvl="2"/>
-            <a:r>
-              <a:rPr lang="en-US" dirty="0" smtClean="0"/>
-              <a:t>will </a:t>
+              <a:t>Will </a:t>
             </a:r>
             <a:r>
               <a:rPr lang="en-US" dirty="0"/>

</xml_diff>